<commit_message>
fix(ddd-and-hex): consistency and readability
</commit_message>
<xml_diff>
--- a/knowledge-sharing/ddd-and-hexagonal-architecture/ddd-and-hexagonal-architecture.es.pptx
+++ b/knowledge-sharing/ddd-and-hexagonal-architecture/ddd-and-hexagonal-architecture.es.pptx
@@ -5,7 +5,7 @@
     <p:sldMasterId id="2147483648" r:id="rId1"/>
   </p:sldMasterIdLst>
   <p:notesMasterIdLst>
-    <p:notesMasterId r:id="rId82"/>
+    <p:notesMasterId r:id="rId83"/>
   </p:notesMasterIdLst>
   <p:sldIdLst>
     <p:sldId id="256" r:id="rId2"/>
@@ -71,23 +71,24 @@
     <p:sldId id="329" r:id="rId62"/>
     <p:sldId id="296" r:id="rId63"/>
     <p:sldId id="328" r:id="rId64"/>
-    <p:sldId id="293" r:id="rId65"/>
-    <p:sldId id="300" r:id="rId66"/>
-    <p:sldId id="301" r:id="rId67"/>
-    <p:sldId id="302" r:id="rId68"/>
-    <p:sldId id="303" r:id="rId69"/>
-    <p:sldId id="304" r:id="rId70"/>
-    <p:sldId id="306" r:id="rId71"/>
-    <p:sldId id="305" r:id="rId72"/>
-    <p:sldId id="332" r:id="rId73"/>
-    <p:sldId id="307" r:id="rId74"/>
-    <p:sldId id="331" r:id="rId75"/>
-    <p:sldId id="333" r:id="rId76"/>
-    <p:sldId id="334" r:id="rId77"/>
-    <p:sldId id="335" r:id="rId78"/>
-    <p:sldId id="273" r:id="rId79"/>
+    <p:sldId id="336" r:id="rId65"/>
+    <p:sldId id="293" r:id="rId66"/>
+    <p:sldId id="300" r:id="rId67"/>
+    <p:sldId id="301" r:id="rId68"/>
+    <p:sldId id="302" r:id="rId69"/>
+    <p:sldId id="303" r:id="rId70"/>
+    <p:sldId id="304" r:id="rId71"/>
+    <p:sldId id="306" r:id="rId72"/>
+    <p:sldId id="305" r:id="rId73"/>
+    <p:sldId id="332" r:id="rId74"/>
+    <p:sldId id="307" r:id="rId75"/>
+    <p:sldId id="331" r:id="rId76"/>
+    <p:sldId id="333" r:id="rId77"/>
+    <p:sldId id="334" r:id="rId78"/>
+    <p:sldId id="335" r:id="rId79"/>
     <p:sldId id="310" r:id="rId80"/>
-    <p:sldId id="309" r:id="rId81"/>
+    <p:sldId id="273" r:id="rId81"/>
+    <p:sldId id="309" r:id="rId82"/>
   </p:sldIdLst>
   <p:sldSz cx="12192000" cy="6858000"/>
   <p:notesSz cx="6858000" cy="9144000"/>
@@ -294,6 +295,7 @@
         </p14:section>
         <p14:section name="Arquitectura Hexagonal - Estructura de archivos" id="{8B6F4FC8-14FE-4027-8BA6-AF1A491F2087}">
           <p14:sldIdLst>
+            <p14:sldId id="336"/>
             <p14:sldId id="293"/>
             <p14:sldId id="300"/>
             <p14:sldId id="301"/>
@@ -312,8 +314,8 @@
             <p14:sldId id="333"/>
             <p14:sldId id="334"/>
             <p14:sldId id="335"/>
+            <p14:sldId id="310"/>
             <p14:sldId id="273"/>
-            <p14:sldId id="310"/>
             <p14:sldId id="309"/>
           </p14:sldIdLst>
         </p14:section>
@@ -5524,6 +5526,60 @@
           </a:p>
         </p:txBody>
       </p:sp>
+      <p:sp>
+        <p:nvSpPr>
+          <p:cNvPr id="4" name="Rectángulo 3">
+            <a:extLst>
+              <a:ext uri="{FF2B5EF4-FFF2-40B4-BE49-F238E27FC236}">
+                <a16:creationId xmlns:a16="http://schemas.microsoft.com/office/drawing/2014/main" id="{85E757AE-DF4E-B0C8-4B3D-6F357D50A390}"/>
+              </a:ext>
+            </a:extLst>
+          </p:cNvPr>
+          <p:cNvSpPr/>
+          <p:nvPr/>
+        </p:nvSpPr>
+        <p:spPr>
+          <a:xfrm>
+            <a:off x="646981" y="3272589"/>
+            <a:ext cx="10593238" cy="807705"/>
+          </a:xfrm>
+          <a:prstGeom prst="rect">
+            <a:avLst/>
+          </a:prstGeom>
+          <a:solidFill>
+            <a:schemeClr val="bg1">
+              <a:alpha val="85000"/>
+            </a:schemeClr>
+          </a:solidFill>
+          <a:ln>
+            <a:noFill/>
+          </a:ln>
+        </p:spPr>
+        <p:style>
+          <a:lnRef idx="2">
+            <a:schemeClr val="accent1">
+              <a:shade val="50000"/>
+            </a:schemeClr>
+          </a:lnRef>
+          <a:fillRef idx="1">
+            <a:schemeClr val="accent1"/>
+          </a:fillRef>
+          <a:effectRef idx="0">
+            <a:schemeClr val="accent1"/>
+          </a:effectRef>
+          <a:fontRef idx="minor">
+            <a:schemeClr val="lt1"/>
+          </a:fontRef>
+        </p:style>
+        <p:txBody>
+          <a:bodyPr rtlCol="0" anchor="ctr"/>
+          <a:lstStyle/>
+          <a:p>
+            <a:pPr algn="ctr"/>
+            <a:endParaRPr lang="es-ES"/>
+          </a:p>
+        </p:txBody>
+      </p:sp>
     </p:spTree>
     <p:extLst>
       <p:ext uri="{BB962C8B-B14F-4D97-AF65-F5344CB8AC3E}">
@@ -5790,6 +5846,60 @@
           </a:p>
         </p:txBody>
       </p:sp>
+      <p:sp>
+        <p:nvSpPr>
+          <p:cNvPr id="4" name="Rectángulo 3">
+            <a:extLst>
+              <a:ext uri="{FF2B5EF4-FFF2-40B4-BE49-F238E27FC236}">
+                <a16:creationId xmlns:a16="http://schemas.microsoft.com/office/drawing/2014/main" id="{76B1D7EA-487B-A3F3-47C9-7E8F3A9C2AD4}"/>
+              </a:ext>
+            </a:extLst>
+          </p:cNvPr>
+          <p:cNvSpPr/>
+          <p:nvPr/>
+        </p:nvSpPr>
+        <p:spPr>
+          <a:xfrm>
+            <a:off x="646981" y="3272589"/>
+            <a:ext cx="10593238" cy="807705"/>
+          </a:xfrm>
+          <a:prstGeom prst="rect">
+            <a:avLst/>
+          </a:prstGeom>
+          <a:solidFill>
+            <a:schemeClr val="bg1">
+              <a:alpha val="85000"/>
+            </a:schemeClr>
+          </a:solidFill>
+          <a:ln>
+            <a:noFill/>
+          </a:ln>
+        </p:spPr>
+        <p:style>
+          <a:lnRef idx="2">
+            <a:schemeClr val="accent1">
+              <a:shade val="50000"/>
+            </a:schemeClr>
+          </a:lnRef>
+          <a:fillRef idx="1">
+            <a:schemeClr val="accent1"/>
+          </a:fillRef>
+          <a:effectRef idx="0">
+            <a:schemeClr val="accent1"/>
+          </a:effectRef>
+          <a:fontRef idx="minor">
+            <a:schemeClr val="lt1"/>
+          </a:fontRef>
+        </p:style>
+        <p:txBody>
+          <a:bodyPr rtlCol="0" anchor="ctr"/>
+          <a:lstStyle/>
+          <a:p>
+            <a:pPr algn="ctr"/>
+            <a:endParaRPr lang="es-ES"/>
+          </a:p>
+        </p:txBody>
+      </p:sp>
     </p:spTree>
     <p:extLst>
       <p:ext uri="{BB962C8B-B14F-4D97-AF65-F5344CB8AC3E}">
@@ -5932,6 +6042,60 @@
           </a:p>
         </p:txBody>
       </p:sp>
+      <p:sp>
+        <p:nvSpPr>
+          <p:cNvPr id="4" name="Rectángulo 3">
+            <a:extLst>
+              <a:ext uri="{FF2B5EF4-FFF2-40B4-BE49-F238E27FC236}">
+                <a16:creationId xmlns:a16="http://schemas.microsoft.com/office/drawing/2014/main" id="{A7151417-2447-2967-383C-215E19A53368}"/>
+              </a:ext>
+            </a:extLst>
+          </p:cNvPr>
+          <p:cNvSpPr/>
+          <p:nvPr/>
+        </p:nvSpPr>
+        <p:spPr>
+          <a:xfrm>
+            <a:off x="646981" y="3272589"/>
+            <a:ext cx="10593238" cy="1799925"/>
+          </a:xfrm>
+          <a:prstGeom prst="rect">
+            <a:avLst/>
+          </a:prstGeom>
+          <a:solidFill>
+            <a:schemeClr val="bg1">
+              <a:alpha val="85000"/>
+            </a:schemeClr>
+          </a:solidFill>
+          <a:ln>
+            <a:noFill/>
+          </a:ln>
+        </p:spPr>
+        <p:style>
+          <a:lnRef idx="2">
+            <a:schemeClr val="accent1">
+              <a:shade val="50000"/>
+            </a:schemeClr>
+          </a:lnRef>
+          <a:fillRef idx="1">
+            <a:schemeClr val="accent1"/>
+          </a:fillRef>
+          <a:effectRef idx="0">
+            <a:schemeClr val="accent1"/>
+          </a:effectRef>
+          <a:fontRef idx="minor">
+            <a:schemeClr val="lt1"/>
+          </a:fontRef>
+        </p:style>
+        <p:txBody>
+          <a:bodyPr rtlCol="0" anchor="ctr"/>
+          <a:lstStyle/>
+          <a:p>
+            <a:pPr algn="ctr"/>
+            <a:endParaRPr lang="es-ES"/>
+          </a:p>
+        </p:txBody>
+      </p:sp>
     </p:spTree>
     <p:extLst>
       <p:ext uri="{BB962C8B-B14F-4D97-AF65-F5344CB8AC3E}">
@@ -6823,6 +6987,60 @@
           </a:p>
         </p:txBody>
       </p:sp>
+      <p:sp>
+        <p:nvSpPr>
+          <p:cNvPr id="2" name="Rectángulo 1">
+            <a:extLst>
+              <a:ext uri="{FF2B5EF4-FFF2-40B4-BE49-F238E27FC236}">
+                <a16:creationId xmlns:a16="http://schemas.microsoft.com/office/drawing/2014/main" id="{5FA1C165-44D9-D0C9-A143-7848DBF38D2B}"/>
+              </a:ext>
+            </a:extLst>
+          </p:cNvPr>
+          <p:cNvSpPr/>
+          <p:nvPr/>
+        </p:nvSpPr>
+        <p:spPr>
+          <a:xfrm>
+            <a:off x="646981" y="3272589"/>
+            <a:ext cx="10593238" cy="807705"/>
+          </a:xfrm>
+          <a:prstGeom prst="rect">
+            <a:avLst/>
+          </a:prstGeom>
+          <a:solidFill>
+            <a:schemeClr val="bg1">
+              <a:alpha val="85000"/>
+            </a:schemeClr>
+          </a:solidFill>
+          <a:ln>
+            <a:noFill/>
+          </a:ln>
+        </p:spPr>
+        <p:style>
+          <a:lnRef idx="2">
+            <a:schemeClr val="accent1">
+              <a:shade val="50000"/>
+            </a:schemeClr>
+          </a:lnRef>
+          <a:fillRef idx="1">
+            <a:schemeClr val="accent1"/>
+          </a:fillRef>
+          <a:effectRef idx="0">
+            <a:schemeClr val="accent1"/>
+          </a:effectRef>
+          <a:fontRef idx="minor">
+            <a:schemeClr val="lt1"/>
+          </a:fontRef>
+        </p:style>
+        <p:txBody>
+          <a:bodyPr rtlCol="0" anchor="ctr"/>
+          <a:lstStyle/>
+          <a:p>
+            <a:pPr algn="ctr"/>
+            <a:endParaRPr lang="es-ES"/>
+          </a:p>
+        </p:txBody>
+      </p:sp>
     </p:spTree>
     <p:extLst>
       <p:ext uri="{BB962C8B-B14F-4D97-AF65-F5344CB8AC3E}">
@@ -6996,6 +7214,60 @@
               <a:t>23</a:t>
             </a:fld>
             <a:endParaRPr lang="es-ES" dirty="0"/>
+          </a:p>
+        </p:txBody>
+      </p:sp>
+      <p:sp>
+        <p:nvSpPr>
+          <p:cNvPr id="2" name="Rectángulo 1">
+            <a:extLst>
+              <a:ext uri="{FF2B5EF4-FFF2-40B4-BE49-F238E27FC236}">
+                <a16:creationId xmlns:a16="http://schemas.microsoft.com/office/drawing/2014/main" id="{B6D3B933-9525-4122-A393-A37CC7DA65EC}"/>
+              </a:ext>
+            </a:extLst>
+          </p:cNvPr>
+          <p:cNvSpPr/>
+          <p:nvPr/>
+        </p:nvSpPr>
+        <p:spPr>
+          <a:xfrm>
+            <a:off x="646981" y="3272589"/>
+            <a:ext cx="10593238" cy="1463040"/>
+          </a:xfrm>
+          <a:prstGeom prst="rect">
+            <a:avLst/>
+          </a:prstGeom>
+          <a:solidFill>
+            <a:schemeClr val="bg1">
+              <a:alpha val="85000"/>
+            </a:schemeClr>
+          </a:solidFill>
+          <a:ln>
+            <a:noFill/>
+          </a:ln>
+        </p:spPr>
+        <p:style>
+          <a:lnRef idx="2">
+            <a:schemeClr val="accent1">
+              <a:shade val="50000"/>
+            </a:schemeClr>
+          </a:lnRef>
+          <a:fillRef idx="1">
+            <a:schemeClr val="accent1"/>
+          </a:fillRef>
+          <a:effectRef idx="0">
+            <a:schemeClr val="accent1"/>
+          </a:effectRef>
+          <a:fontRef idx="minor">
+            <a:schemeClr val="lt1"/>
+          </a:fontRef>
+        </p:style>
+        <p:txBody>
+          <a:bodyPr rtlCol="0" anchor="ctr"/>
+          <a:lstStyle/>
+          <a:p>
+            <a:pPr algn="ctr"/>
+            <a:endParaRPr lang="es-ES"/>
           </a:p>
         </p:txBody>
       </p:sp>
@@ -7296,7 +7568,7 @@
           <a:p>
             <a:r>
               <a:rPr lang="es-ES" dirty="0"/>
-              <a:t>De los peores renombrados de la historia</a:t>
+              <a:t>De los peores cambios de nombre de la historia</a:t>
             </a:r>
           </a:p>
         </p:txBody>
@@ -7506,6 +7778,13 @@
           <a:ln>
             <a:noFill/>
           </a:ln>
+          <a:effectLst>
+            <a:outerShdw blurRad="50800" dist="38100" dir="5400000" algn="t" rotWithShape="0">
+              <a:prstClr val="black">
+                <a:alpha val="40000"/>
+              </a:prstClr>
+            </a:outerShdw>
+          </a:effectLst>
         </p:spPr>
         <p:style>
           <a:lnRef idx="2">
@@ -8998,7 +9277,7 @@
           <a:p>
             <a:r>
               <a:rPr lang="es-ES" b="1" dirty="0"/>
-              <a:t>Se quiere evitar</a:t>
+              <a:t>Se quiere evitar que</a:t>
             </a:r>
             <a:r>
               <a:rPr lang="es-ES" dirty="0"/>
@@ -9160,7 +9439,7 @@
           <a:lstStyle/>
           <a:p>
             <a:r>
-              <a:rPr lang="es-ES" dirty="0"/>
+              <a:rPr lang="es-ES" b="1" dirty="0"/>
               <a:t>Dominio</a:t>
             </a:r>
           </a:p>
@@ -9174,13 +9453,13 @@
           </a:p>
           <a:p>
             <a:r>
-              <a:rPr lang="es-ES" dirty="0"/>
+              <a:rPr lang="es-ES" b="1" dirty="0"/>
               <a:t>Aplicación (o caso de uso)</a:t>
             </a:r>
           </a:p>
           <a:p>
             <a:r>
-              <a:rPr lang="es-ES" dirty="0"/>
+              <a:rPr lang="es-ES" b="1" dirty="0"/>
               <a:t>Infraestructura</a:t>
             </a:r>
           </a:p>
@@ -9855,7 +10134,7 @@
           <a:lstStyle/>
           <a:p>
             <a:r>
-              <a:rPr lang="es-ES" dirty="0"/>
+              <a:rPr lang="es-ES" b="1" dirty="0"/>
               <a:t>DDD</a:t>
             </a:r>
           </a:p>
@@ -9891,7 +10170,7 @@
           </a:p>
           <a:p>
             <a:r>
-              <a:rPr lang="es-ES" dirty="0"/>
+              <a:rPr lang="es-ES" b="1" dirty="0"/>
               <a:t>Arquitectura Hexagonal</a:t>
             </a:r>
           </a:p>
@@ -10167,6 +10446,13 @@
           <a:ln>
             <a:noFill/>
           </a:ln>
+          <a:effectLst>
+            <a:outerShdw blurRad="50800" dist="38100" dir="5400000" algn="t" rotWithShape="0">
+              <a:prstClr val="black">
+                <a:alpha val="40000"/>
+              </a:prstClr>
+            </a:outerShdw>
+          </a:effectLst>
         </p:spPr>
         <p:style>
           <a:lnRef idx="2">
@@ -10344,6 +10630,13 @@
           <a:ln>
             <a:noFill/>
           </a:ln>
+          <a:effectLst>
+            <a:outerShdw blurRad="50800" dist="38100" dir="5400000" algn="t" rotWithShape="0">
+              <a:prstClr val="black">
+                <a:alpha val="40000"/>
+              </a:prstClr>
+            </a:outerShdw>
+          </a:effectLst>
         </p:spPr>
         <p:style>
           <a:lnRef idx="2">
@@ -10663,6 +10956,13 @@
           <a:ln>
             <a:noFill/>
           </a:ln>
+          <a:effectLst>
+            <a:outerShdw blurRad="50800" dist="38100" dir="5400000" algn="t" rotWithShape="0">
+              <a:prstClr val="black">
+                <a:alpha val="40000"/>
+              </a:prstClr>
+            </a:outerShdw>
+          </a:effectLst>
         </p:spPr>
         <p:style>
           <a:lnRef idx="2">
@@ -14991,7 +15291,7 @@
           <p:cNvPr id="2" name="Título 1">
             <a:extLst>
               <a:ext uri="{FF2B5EF4-FFF2-40B4-BE49-F238E27FC236}">
-                <a16:creationId xmlns:a16="http://schemas.microsoft.com/office/drawing/2014/main" id="{C44D90F8-BA9F-FF25-EC60-A4B107CD8AD4}"/>
+                <a16:creationId xmlns:a16="http://schemas.microsoft.com/office/drawing/2014/main" id="{2709ABDB-0ACA-3D62-A64C-029422A20EBA}"/>
               </a:ext>
             </a:extLst>
           </p:cNvPr>
@@ -15009,111 +15309,42 @@
           <a:p>
             <a:r>
               <a:rPr lang="es-ES" dirty="0"/>
-              <a:t>Particiones</a:t>
-            </a:r>
-          </a:p>
-        </p:txBody>
-      </p:sp>
-      <p:sp>
-        <p:nvSpPr>
-          <p:cNvPr id="3" name="Marcador de contenido 2">
-            <a:extLst>
-              <a:ext uri="{FF2B5EF4-FFF2-40B4-BE49-F238E27FC236}">
-                <a16:creationId xmlns:a16="http://schemas.microsoft.com/office/drawing/2014/main" id="{B01C93D7-F836-5E0C-9388-B5042467919E}"/>
-              </a:ext>
-            </a:extLst>
-          </p:cNvPr>
-          <p:cNvSpPr>
-            <a:spLocks noGrp="1"/>
-          </p:cNvSpPr>
-          <p:nvPr>
-            <p:ph idx="1"/>
+              <a:t>Estructura de archivos</a:t>
+            </a:r>
+          </a:p>
+        </p:txBody>
+      </p:sp>
+      <p:sp>
+        <p:nvSpPr>
+          <p:cNvPr id="5" name="Marcador de texto 4">
+            <a:extLst>
+              <a:ext uri="{FF2B5EF4-FFF2-40B4-BE49-F238E27FC236}">
+                <a16:creationId xmlns:a16="http://schemas.microsoft.com/office/drawing/2014/main" id="{DD7BCB77-C473-CAC3-ABA1-39F257B9B06D}"/>
+              </a:ext>
+            </a:extLst>
+          </p:cNvPr>
+          <p:cNvSpPr>
+            <a:spLocks noGrp="1"/>
+          </p:cNvSpPr>
+          <p:nvPr>
+            <p:ph type="body" idx="1"/>
           </p:nvPr>
         </p:nvSpPr>
         <p:spPr/>
         <p:txBody>
-          <a:bodyPr>
-            <a:normAutofit lnSpcReduction="10000"/>
-          </a:bodyPr>
-          <a:lstStyle/>
-          <a:p>
-            <a:r>
-              <a:rPr lang="es-ES" dirty="0"/>
-              <a:t>Técnica</a:t>
-            </a:r>
-          </a:p>
-          <a:p>
-            <a:pPr lvl="1"/>
-            <a:r>
-              <a:rPr lang="es-ES" dirty="0"/>
-              <a:t>Un nivel</a:t>
-            </a:r>
-          </a:p>
-          <a:p>
-            <a:pPr lvl="1"/>
-            <a:r>
-              <a:rPr lang="es-ES" dirty="0"/>
-              <a:t>Por </a:t>
-            </a:r>
-            <a:r>
-              <a:rPr lang="es-ES" dirty="0" err="1"/>
-              <a:t>feature</a:t>
-            </a:r>
-            <a:endParaRPr lang="es-ES" dirty="0"/>
-          </a:p>
-          <a:p>
-            <a:r>
-              <a:rPr lang="es-ES" dirty="0"/>
-              <a:t>Negocio</a:t>
-            </a:r>
-          </a:p>
-          <a:p>
-            <a:pPr lvl="1"/>
-            <a:r>
-              <a:rPr lang="es-ES" dirty="0"/>
-              <a:t>Por </a:t>
-            </a:r>
-            <a:r>
-              <a:rPr lang="es-ES" dirty="0" err="1"/>
-              <a:t>bounded</a:t>
-            </a:r>
-            <a:r>
-              <a:rPr lang="es-ES" dirty="0"/>
-              <a:t> </a:t>
-            </a:r>
-            <a:r>
-              <a:rPr lang="es-ES" dirty="0" err="1"/>
-              <a:t>context</a:t>
-            </a:r>
-            <a:endParaRPr lang="es-ES" dirty="0"/>
-          </a:p>
-          <a:p>
-            <a:pPr lvl="1"/>
-            <a:r>
-              <a:rPr lang="es-ES" dirty="0"/>
-              <a:t>Por </a:t>
-            </a:r>
-            <a:r>
-              <a:rPr lang="es-ES" dirty="0" err="1"/>
-              <a:t>feature</a:t>
-            </a:r>
-            <a:endParaRPr lang="es-ES" dirty="0"/>
-          </a:p>
-          <a:p>
-            <a:pPr lvl="1"/>
-            <a:r>
-              <a:rPr lang="es-ES" dirty="0"/>
-              <a:t>O incluso ambas</a:t>
-            </a:r>
-          </a:p>
-        </p:txBody>
-      </p:sp>
-      <p:sp>
-        <p:nvSpPr>
-          <p:cNvPr id="6" name="Marcador de número de diapositiva 3">
-            <a:extLst>
-              <a:ext uri="{FF2B5EF4-FFF2-40B4-BE49-F238E27FC236}">
-                <a16:creationId xmlns:a16="http://schemas.microsoft.com/office/drawing/2014/main" id="{62CF5160-4DE3-B42D-82DC-A498690CDEFD}"/>
+          <a:bodyPr/>
+          <a:lstStyle/>
+          <a:p>
+            <a:endParaRPr lang="es-ES"/>
+          </a:p>
+        </p:txBody>
+      </p:sp>
+      <p:sp>
+        <p:nvSpPr>
+          <p:cNvPr id="4" name="Marcador de número de diapositiva 3">
+            <a:extLst>
+              <a:ext uri="{FF2B5EF4-FFF2-40B4-BE49-F238E27FC236}">
+                <a16:creationId xmlns:a16="http://schemas.microsoft.com/office/drawing/2014/main" id="{42D5016D-AC9C-CFCF-5F1A-E107B168B098}"/>
               </a:ext>
             </a:extLst>
           </p:cNvPr>
@@ -15124,18 +15355,13 @@
             <p:ph type="sldNum" sz="quarter" idx="4"/>
           </p:nvPr>
         </p:nvSpPr>
-        <p:spPr>
-          <a:xfrm>
-            <a:off x="8610600" y="6356350"/>
-            <a:ext cx="2743200" cy="365125"/>
-          </a:xfrm>
-        </p:spPr>
-        <p:txBody>
-          <a:bodyPr/>
-          <a:lstStyle/>
-          <a:p>
-            <a:r>
-              <a:rPr lang="es-ES" dirty="0"/>
+        <p:spPr/>
+        <p:txBody>
+          <a:bodyPr/>
+          <a:lstStyle/>
+          <a:p>
+            <a:r>
+              <a:rPr lang="es-ES"/>
               <a:t>09/2024 | Pepe Fabra Valverde | </a:t>
             </a:r>
             <a:fld id="{B87D0AB6-8E4A-4BD5-8779-ABED7EE2B505}" type="slidenum">
@@ -15150,7 +15376,7 @@
     </p:spTree>
     <p:extLst>
       <p:ext uri="{BB962C8B-B14F-4D97-AF65-F5344CB8AC3E}">
-        <p14:creationId xmlns:p14="http://schemas.microsoft.com/office/powerpoint/2010/main" val="1302805541"/>
+        <p14:creationId xmlns:p14="http://schemas.microsoft.com/office/powerpoint/2010/main" val="3915157291"/>
       </p:ext>
     </p:extLst>
   </p:cSld>
@@ -15179,10 +15405,10 @@
       </p:grpSpPr>
       <p:sp>
         <p:nvSpPr>
-          <p:cNvPr id="4" name="Título 3">
-            <a:extLst>
-              <a:ext uri="{FF2B5EF4-FFF2-40B4-BE49-F238E27FC236}">
-                <a16:creationId xmlns:a16="http://schemas.microsoft.com/office/drawing/2014/main" id="{429211CE-E272-8FB0-0928-678EFB68B07F}"/>
+          <p:cNvPr id="2" name="Título 1">
+            <a:extLst>
+              <a:ext uri="{FF2B5EF4-FFF2-40B4-BE49-F238E27FC236}">
+                <a16:creationId xmlns:a16="http://schemas.microsoft.com/office/drawing/2014/main" id="{C44D90F8-BA9F-FF25-EC60-A4B107CD8AD4}"/>
               </a:ext>
             </a:extLst>
           </p:cNvPr>
@@ -15200,17 +15426,17 @@
           <a:p>
             <a:r>
               <a:rPr lang="es-ES" dirty="0"/>
-              <a:t>Técnica - Un nivel</a:t>
-            </a:r>
-          </a:p>
-        </p:txBody>
-      </p:sp>
-      <p:sp>
-        <p:nvSpPr>
-          <p:cNvPr id="5" name="Marcador de contenido 4">
-            <a:extLst>
-              <a:ext uri="{FF2B5EF4-FFF2-40B4-BE49-F238E27FC236}">
-                <a16:creationId xmlns:a16="http://schemas.microsoft.com/office/drawing/2014/main" id="{EEA7BC50-2244-B8DE-03E5-5E7C72563F3A}"/>
+              <a:t>Particiones</a:t>
+            </a:r>
+          </a:p>
+        </p:txBody>
+      </p:sp>
+      <p:sp>
+        <p:nvSpPr>
+          <p:cNvPr id="3" name="Marcador de contenido 2">
+            <a:extLst>
+              <a:ext uri="{FF2B5EF4-FFF2-40B4-BE49-F238E27FC236}">
+                <a16:creationId xmlns:a16="http://schemas.microsoft.com/office/drawing/2014/main" id="{B01C93D7-F836-5E0C-9388-B5042467919E}"/>
               </a:ext>
             </a:extLst>
           </p:cNvPr>
@@ -15223,27 +15449,58 @@
         </p:nvSpPr>
         <p:spPr/>
         <p:txBody>
-          <a:bodyPr/>
-          <a:lstStyle/>
-          <a:p>
+          <a:bodyPr>
+            <a:normAutofit lnSpcReduction="10000"/>
+          </a:bodyPr>
+          <a:lstStyle/>
+          <a:p>
+            <a:r>
+              <a:rPr lang="es-ES" dirty="0"/>
+              <a:t>Técnica</a:t>
+            </a:r>
+          </a:p>
+          <a:p>
+            <a:pPr lvl="1"/>
+            <a:r>
+              <a:rPr lang="es-ES" dirty="0"/>
+              <a:t>Un nivel</a:t>
+            </a:r>
+          </a:p>
+          <a:p>
+            <a:pPr lvl="1"/>
+            <a:r>
+              <a:rPr lang="es-ES" dirty="0"/>
+              <a:t>Por </a:t>
+            </a:r>
             <a:r>
               <a:rPr lang="es-ES" dirty="0" err="1"/>
-              <a:t>application</a:t>
-            </a:r>
-            <a:endParaRPr lang="es-ES" dirty="0"/>
+              <a:t>feature</a:t>
+            </a:r>
+            <a:endParaRPr lang="es-ES" dirty="0"/>
+          </a:p>
+          <a:p>
+            <a:r>
+              <a:rPr lang="es-ES" dirty="0"/>
+              <a:t>Negocio</a:t>
+            </a:r>
           </a:p>
           <a:p>
             <a:pPr lvl="1"/>
             <a:r>
+              <a:rPr lang="es-ES" dirty="0"/>
+              <a:t>Por </a:t>
+            </a:r>
+            <a:r>
               <a:rPr lang="es-ES" dirty="0" err="1"/>
-              <a:t>PublishVideoApplicationService</a:t>
-            </a:r>
-            <a:endParaRPr lang="es-ES" dirty="0"/>
-          </a:p>
-          <a:p>
+              <a:t>bounded</a:t>
+            </a:r>
+            <a:r>
+              <a:rPr lang="es-ES" dirty="0"/>
+              <a:t> </a:t>
+            </a:r>
             <a:r>
               <a:rPr lang="es-ES" dirty="0" err="1"/>
-              <a:t>domain</a:t>
+              <a:t>context</a:t>
             </a:r>
             <a:endParaRPr lang="es-ES" dirty="0"/>
           </a:p>
@@ -15251,40 +15508,29 @@
             <a:pPr lvl="1"/>
             <a:r>
               <a:rPr lang="es-ES" dirty="0"/>
-              <a:t>Video</a:t>
-            </a:r>
+              <a:t>Por </a:t>
+            </a:r>
+            <a:r>
+              <a:rPr lang="es-ES" dirty="0" err="1"/>
+              <a:t>feature</a:t>
+            </a:r>
+            <a:endParaRPr lang="es-ES" dirty="0"/>
           </a:p>
           <a:p>
             <a:pPr lvl="1"/>
             <a:r>
-              <a:rPr lang="es-ES" dirty="0" err="1"/>
-              <a:t>PublishVideoRepository</a:t>
-            </a:r>
-            <a:endParaRPr lang="es-ES" dirty="0"/>
-          </a:p>
-          <a:p>
-            <a:r>
-              <a:rPr lang="es-ES" dirty="0" err="1"/>
-              <a:t>infrastructure</a:t>
-            </a:r>
-            <a:endParaRPr lang="es-ES" dirty="0"/>
-          </a:p>
-          <a:p>
-            <a:pPr lvl="1"/>
-            <a:r>
-              <a:rPr lang="es-ES" dirty="0" err="1"/>
-              <a:t>YouTubePublishVideoRepositoryAdapter</a:t>
-            </a:r>
-            <a:endParaRPr lang="es-ES" dirty="0"/>
-          </a:p>
-        </p:txBody>
-      </p:sp>
-      <p:sp>
-        <p:nvSpPr>
-          <p:cNvPr id="8" name="Marcador de número de diapositiva 3">
-            <a:extLst>
-              <a:ext uri="{FF2B5EF4-FFF2-40B4-BE49-F238E27FC236}">
-                <a16:creationId xmlns:a16="http://schemas.microsoft.com/office/drawing/2014/main" id="{6E72A41E-5EB9-51A9-7BED-3AD4E5D88629}"/>
+              <a:rPr lang="es-ES" dirty="0"/>
+              <a:t>O incluso ambas</a:t>
+            </a:r>
+          </a:p>
+        </p:txBody>
+      </p:sp>
+      <p:sp>
+        <p:nvSpPr>
+          <p:cNvPr id="6" name="Marcador de número de diapositiva 3">
+            <a:extLst>
+              <a:ext uri="{FF2B5EF4-FFF2-40B4-BE49-F238E27FC236}">
+                <a16:creationId xmlns:a16="http://schemas.microsoft.com/office/drawing/2014/main" id="{62CF5160-4DE3-B42D-82DC-A498690CDEFD}"/>
               </a:ext>
             </a:extLst>
           </p:cNvPr>
@@ -15321,7 +15567,7 @@
     </p:spTree>
     <p:extLst>
       <p:ext uri="{BB962C8B-B14F-4D97-AF65-F5344CB8AC3E}">
-        <p14:creationId xmlns:p14="http://schemas.microsoft.com/office/powerpoint/2010/main" val="1343300758"/>
+        <p14:creationId xmlns:p14="http://schemas.microsoft.com/office/powerpoint/2010/main" val="1302805541"/>
       </p:ext>
     </p:extLst>
   </p:cSld>
@@ -15371,13 +15617,8 @@
           <a:p>
             <a:r>
               <a:rPr lang="es-ES" dirty="0"/>
-              <a:t>Técnica - Por </a:t>
-            </a:r>
-            <a:r>
-              <a:rPr lang="es-ES" dirty="0" err="1"/>
-              <a:t>feature</a:t>
-            </a:r>
-            <a:endParaRPr lang="es-ES" dirty="0"/>
+              <a:t>Técnica - Un nivel</a:t>
+            </a:r>
           </a:p>
         </p:txBody>
       </p:sp>
@@ -15412,14 +15653,6 @@
             <a:pPr lvl="1"/>
             <a:r>
               <a:rPr lang="es-ES" dirty="0" err="1"/>
-              <a:t>PublishVideo</a:t>
-            </a:r>
-            <a:endParaRPr lang="es-ES" dirty="0"/>
-          </a:p>
-          <a:p>
-            <a:pPr lvl="2"/>
-            <a:r>
-              <a:rPr lang="es-ES" dirty="0" err="1"/>
               <a:t>PublishVideoApplicationService</a:t>
             </a:r>
             <a:endParaRPr lang="es-ES" dirty="0"/>
@@ -15442,14 +15675,6 @@
             <a:pPr lvl="1"/>
             <a:r>
               <a:rPr lang="es-ES" dirty="0" err="1"/>
-              <a:t>PublishVideo</a:t>
-            </a:r>
-            <a:endParaRPr lang="es-ES" dirty="0"/>
-          </a:p>
-          <a:p>
-            <a:pPr lvl="2"/>
-            <a:r>
-              <a:rPr lang="es-ES" dirty="0" err="1"/>
               <a:t>PublishVideoRepository</a:t>
             </a:r>
             <a:endParaRPr lang="es-ES" dirty="0"/>
@@ -15465,14 +15690,6 @@
             <a:pPr lvl="1"/>
             <a:r>
               <a:rPr lang="es-ES" dirty="0" err="1"/>
-              <a:t>PublishVideo</a:t>
-            </a:r>
-            <a:endParaRPr lang="es-ES" dirty="0"/>
-          </a:p>
-          <a:p>
-            <a:pPr lvl="2"/>
-            <a:r>
-              <a:rPr lang="es-ES" dirty="0" err="1"/>
               <a:t>YouTubePublishVideoRepositoryAdapter</a:t>
             </a:r>
             <a:endParaRPr lang="es-ES" dirty="0"/>
@@ -15481,10 +15698,10 @@
       </p:sp>
       <p:sp>
         <p:nvSpPr>
-          <p:cNvPr id="6" name="Marcador de número de diapositiva 3">
-            <a:extLst>
-              <a:ext uri="{FF2B5EF4-FFF2-40B4-BE49-F238E27FC236}">
-                <a16:creationId xmlns:a16="http://schemas.microsoft.com/office/drawing/2014/main" id="{27824F99-94DA-1243-32F6-94F48366F6BD}"/>
+          <p:cNvPr id="8" name="Marcador de número de diapositiva 3">
+            <a:extLst>
+              <a:ext uri="{FF2B5EF4-FFF2-40B4-BE49-F238E27FC236}">
+                <a16:creationId xmlns:a16="http://schemas.microsoft.com/office/drawing/2014/main" id="{6E72A41E-5EB9-51A9-7BED-3AD4E5D88629}"/>
               </a:ext>
             </a:extLst>
           </p:cNvPr>
@@ -15521,7 +15738,7 @@
     </p:spTree>
     <p:extLst>
       <p:ext uri="{BB962C8B-B14F-4D97-AF65-F5344CB8AC3E}">
-        <p14:creationId xmlns:p14="http://schemas.microsoft.com/office/powerpoint/2010/main" val="3146748499"/>
+        <p14:creationId xmlns:p14="http://schemas.microsoft.com/office/powerpoint/2010/main" val="1343300758"/>
       </p:ext>
     </p:extLst>
   </p:cSld>
@@ -15571,11 +15788,11 @@
           <a:p>
             <a:r>
               <a:rPr lang="es-ES" dirty="0"/>
-              <a:t>Negocio - </a:t>
+              <a:t>Técnica - Por </a:t>
             </a:r>
             <a:r>
               <a:rPr lang="es-ES" dirty="0" err="1"/>
-              <a:t>BoundedContext</a:t>
+              <a:t>feature</a:t>
             </a:r>
             <a:endParaRPr lang="es-ES" dirty="0"/>
           </a:p>
@@ -15599,18 +15816,9 @@
         </p:nvSpPr>
         <p:spPr/>
         <p:txBody>
-          <a:bodyPr>
-            <a:normAutofit/>
-          </a:bodyPr>
-          <a:lstStyle/>
-          <a:p>
-            <a:r>
-              <a:rPr lang="es-ES" dirty="0"/>
-              <a:t>Video</a:t>
-            </a:r>
-          </a:p>
-          <a:p>
-            <a:pPr lvl="1"/>
+          <a:bodyPr/>
+          <a:lstStyle/>
+          <a:p>
             <a:r>
               <a:rPr lang="es-ES" dirty="0" err="1"/>
               <a:t>application</a:t>
@@ -15618,15 +15826,15 @@
             <a:endParaRPr lang="es-ES" dirty="0"/>
           </a:p>
           <a:p>
+            <a:pPr lvl="1"/>
+            <a:r>
+              <a:rPr lang="es-ES" dirty="0" err="1"/>
+              <a:t>PublishVideo</a:t>
+            </a:r>
+            <a:endParaRPr lang="es-ES" dirty="0"/>
+          </a:p>
+          <a:p>
             <a:pPr lvl="2"/>
-            <a:r>
-              <a:rPr lang="es-ES" dirty="0" err="1"/>
-              <a:t>Publish</a:t>
-            </a:r>
-            <a:endParaRPr lang="es-ES" dirty="0"/>
-          </a:p>
-          <a:p>
-            <a:pPr lvl="3"/>
             <a:r>
               <a:rPr lang="es-ES" dirty="0" err="1"/>
               <a:t>PublishVideoApplicationService</a:t>
@@ -15634,7 +15842,6 @@
             <a:endParaRPr lang="es-ES" dirty="0"/>
           </a:p>
           <a:p>
-            <a:pPr lvl="1"/>
             <a:r>
               <a:rPr lang="es-ES" dirty="0" err="1"/>
               <a:t>domain</a:t>
@@ -15642,6 +15849,21 @@
             <a:endParaRPr lang="es-ES" dirty="0"/>
           </a:p>
           <a:p>
+            <a:pPr lvl="1"/>
+            <a:r>
+              <a:rPr lang="es-ES" dirty="0"/>
+              <a:t>Video</a:t>
+            </a:r>
+          </a:p>
+          <a:p>
+            <a:pPr lvl="1"/>
+            <a:r>
+              <a:rPr lang="es-ES" dirty="0" err="1"/>
+              <a:t>PublishVideo</a:t>
+            </a:r>
+            <a:endParaRPr lang="es-ES" dirty="0"/>
+          </a:p>
+          <a:p>
             <a:pPr lvl="2"/>
             <a:r>
               <a:rPr lang="es-ES" dirty="0" err="1"/>
@@ -15650,7 +15872,6 @@
             <a:endParaRPr lang="es-ES" dirty="0"/>
           </a:p>
           <a:p>
-            <a:pPr lvl="1"/>
             <a:r>
               <a:rPr lang="es-ES" dirty="0" err="1"/>
               <a:t>infrastructure</a:t>
@@ -15658,6 +15879,14 @@
             <a:endParaRPr lang="es-ES" dirty="0"/>
           </a:p>
           <a:p>
+            <a:pPr lvl="1"/>
+            <a:r>
+              <a:rPr lang="es-ES" dirty="0" err="1"/>
+              <a:t>PublishVideo</a:t>
+            </a:r>
+            <a:endParaRPr lang="es-ES" dirty="0"/>
+          </a:p>
+          <a:p>
             <a:pPr lvl="2"/>
             <a:r>
               <a:rPr lang="es-ES" dirty="0" err="1"/>
@@ -15672,7 +15901,7 @@
           <p:cNvPr id="6" name="Marcador de número de diapositiva 3">
             <a:extLst>
               <a:ext uri="{FF2B5EF4-FFF2-40B4-BE49-F238E27FC236}">
-                <a16:creationId xmlns:a16="http://schemas.microsoft.com/office/drawing/2014/main" id="{09509D03-C670-8E1D-6289-97ADF54DA2EC}"/>
+                <a16:creationId xmlns:a16="http://schemas.microsoft.com/office/drawing/2014/main" id="{27824F99-94DA-1243-32F6-94F48366F6BD}"/>
               </a:ext>
             </a:extLst>
           </p:cNvPr>
@@ -15709,7 +15938,7 @@
     </p:spTree>
     <p:extLst>
       <p:ext uri="{BB962C8B-B14F-4D97-AF65-F5344CB8AC3E}">
-        <p14:creationId xmlns:p14="http://schemas.microsoft.com/office/powerpoint/2010/main" val="3697534944"/>
+        <p14:creationId xmlns:p14="http://schemas.microsoft.com/office/powerpoint/2010/main" val="3146748499"/>
       </p:ext>
     </p:extLst>
   </p:cSld>
@@ -15763,7 +15992,7 @@
             </a:r>
             <a:r>
               <a:rPr lang="es-ES" dirty="0" err="1"/>
-              <a:t>Feature</a:t>
+              <a:t>BoundedContext</a:t>
             </a:r>
             <a:endParaRPr lang="es-ES" dirty="0"/>
           </a:p>
@@ -15793,10 +16022,9 @@
           <a:lstStyle/>
           <a:p>
             <a:r>
-              <a:rPr lang="es-ES" dirty="0" err="1"/>
-              <a:t>PublishVideo</a:t>
-            </a:r>
-            <a:endParaRPr lang="es-ES" dirty="0"/>
+              <a:rPr lang="es-ES" dirty="0"/>
+              <a:t>Video</a:t>
+            </a:r>
           </a:p>
           <a:p>
             <a:pPr lvl="1"/>
@@ -15810,6 +16038,14 @@
             <a:pPr lvl="2"/>
             <a:r>
               <a:rPr lang="es-ES" dirty="0" err="1"/>
+              <a:t>Publish</a:t>
+            </a:r>
+            <a:endParaRPr lang="es-ES" dirty="0"/>
+          </a:p>
+          <a:p>
+            <a:pPr lvl="3"/>
+            <a:r>
+              <a:rPr lang="es-ES" dirty="0" err="1"/>
               <a:t>PublishVideoApplicationService</a:t>
             </a:r>
             <a:endParaRPr lang="es-ES" dirty="0"/>
@@ -15853,7 +16089,7 @@
           <p:cNvPr id="6" name="Marcador de número de diapositiva 3">
             <a:extLst>
               <a:ext uri="{FF2B5EF4-FFF2-40B4-BE49-F238E27FC236}">
-                <a16:creationId xmlns:a16="http://schemas.microsoft.com/office/drawing/2014/main" id="{A20E8444-46AE-B414-1AFE-50FCAB90307C}"/>
+                <a16:creationId xmlns:a16="http://schemas.microsoft.com/office/drawing/2014/main" id="{09509D03-C670-8E1D-6289-97ADF54DA2EC}"/>
               </a:ext>
             </a:extLst>
           </p:cNvPr>
@@ -15890,7 +16126,7 @@
     </p:spTree>
     <p:extLst>
       <p:ext uri="{BB962C8B-B14F-4D97-AF65-F5344CB8AC3E}">
-        <p14:creationId xmlns:p14="http://schemas.microsoft.com/office/powerpoint/2010/main" val="2558641126"/>
+        <p14:creationId xmlns:p14="http://schemas.microsoft.com/office/powerpoint/2010/main" val="3697534944"/>
       </p:ext>
     </p:extLst>
   </p:cSld>
@@ -15944,14 +16180,6 @@
             </a:r>
             <a:r>
               <a:rPr lang="es-ES" dirty="0" err="1"/>
-              <a:t>BoundedContext</a:t>
-            </a:r>
-            <a:r>
-              <a:rPr lang="es-ES" dirty="0"/>
-              <a:t> y </a:t>
-            </a:r>
-            <a:r>
-              <a:rPr lang="es-ES" dirty="0" err="1"/>
               <a:t>Feature</a:t>
             </a:r>
             <a:endParaRPr lang="es-ES" dirty="0"/>
@@ -15982,20 +16210,13 @@
           <a:lstStyle/>
           <a:p>
             <a:r>
-              <a:rPr lang="es-ES" dirty="0"/>
-              <a:t>Video</a:t>
-            </a:r>
+              <a:rPr lang="es-ES" dirty="0" err="1"/>
+              <a:t>PublishVideo</a:t>
+            </a:r>
+            <a:endParaRPr lang="es-ES" dirty="0"/>
           </a:p>
           <a:p>
             <a:pPr lvl="1"/>
-            <a:r>
-              <a:rPr lang="es-ES" dirty="0" err="1"/>
-              <a:t>Publish</a:t>
-            </a:r>
-            <a:endParaRPr lang="es-ES" dirty="0"/>
-          </a:p>
-          <a:p>
-            <a:pPr lvl="2"/>
             <a:r>
               <a:rPr lang="es-ES" dirty="0" err="1"/>
               <a:t>application</a:t>
@@ -16003,7 +16224,7 @@
             <a:endParaRPr lang="es-ES" dirty="0"/>
           </a:p>
           <a:p>
-            <a:pPr lvl="3"/>
+            <a:pPr lvl="2"/>
             <a:r>
               <a:rPr lang="es-ES" dirty="0" err="1"/>
               <a:t>PublishVideoApplicationService</a:t>
@@ -16011,7 +16232,7 @@
             <a:endParaRPr lang="es-ES" dirty="0"/>
           </a:p>
           <a:p>
-            <a:pPr lvl="2"/>
+            <a:pPr lvl="1"/>
             <a:r>
               <a:rPr lang="es-ES" dirty="0" err="1"/>
               <a:t>domain</a:t>
@@ -16019,7 +16240,7 @@
             <a:endParaRPr lang="es-ES" dirty="0"/>
           </a:p>
           <a:p>
-            <a:pPr lvl="3"/>
+            <a:pPr lvl="2"/>
             <a:r>
               <a:rPr lang="es-ES" dirty="0" err="1"/>
               <a:t>PublishVideoRepository</a:t>
@@ -16027,7 +16248,7 @@
             <a:endParaRPr lang="es-ES" dirty="0"/>
           </a:p>
           <a:p>
-            <a:pPr lvl="2"/>
+            <a:pPr lvl="1"/>
             <a:r>
               <a:rPr lang="es-ES" dirty="0" err="1"/>
               <a:t>infrastructure</a:t>
@@ -16035,7 +16256,7 @@
             <a:endParaRPr lang="es-ES" dirty="0"/>
           </a:p>
           <a:p>
-            <a:pPr lvl="3"/>
+            <a:pPr lvl="2"/>
             <a:r>
               <a:rPr lang="es-ES" dirty="0" err="1"/>
               <a:t>YouTubePublishVideoRepositoryAdapter</a:t>
@@ -16049,7 +16270,7 @@
           <p:cNvPr id="6" name="Marcador de número de diapositiva 3">
             <a:extLst>
               <a:ext uri="{FF2B5EF4-FFF2-40B4-BE49-F238E27FC236}">
-                <a16:creationId xmlns:a16="http://schemas.microsoft.com/office/drawing/2014/main" id="{1BB20320-0E41-828D-2BA4-39A74111C7AA}"/>
+                <a16:creationId xmlns:a16="http://schemas.microsoft.com/office/drawing/2014/main" id="{A20E8444-46AE-B414-1AFE-50FCAB90307C}"/>
               </a:ext>
             </a:extLst>
           </p:cNvPr>
@@ -16086,7 +16307,7 @@
     </p:spTree>
     <p:extLst>
       <p:ext uri="{BB962C8B-B14F-4D97-AF65-F5344CB8AC3E}">
-        <p14:creationId xmlns:p14="http://schemas.microsoft.com/office/powerpoint/2010/main" val="3884166731"/>
+        <p14:creationId xmlns:p14="http://schemas.microsoft.com/office/powerpoint/2010/main" val="2558641126"/>
       </p:ext>
     </p:extLst>
   </p:cSld>
@@ -16259,7 +16480,7 @@
           <p:cNvPr id="4" name="Título 3">
             <a:extLst>
               <a:ext uri="{FF2B5EF4-FFF2-40B4-BE49-F238E27FC236}">
-                <a16:creationId xmlns:a16="http://schemas.microsoft.com/office/drawing/2014/main" id="{87608981-4892-9105-E43C-8001955697FF}"/>
+                <a16:creationId xmlns:a16="http://schemas.microsoft.com/office/drawing/2014/main" id="{429211CE-E272-8FB0-0928-678EFB68B07F}"/>
               </a:ext>
             </a:extLst>
           </p:cNvPr>
@@ -16277,8 +16498,21 @@
           <a:p>
             <a:r>
               <a:rPr lang="es-ES" dirty="0"/>
-              <a:t>Gustos colores</a:t>
-            </a:r>
+              <a:t>Negocio - </a:t>
+            </a:r>
+            <a:r>
+              <a:rPr lang="es-ES" dirty="0" err="1"/>
+              <a:t>BoundedContext</a:t>
+            </a:r>
+            <a:r>
+              <a:rPr lang="es-ES" dirty="0"/>
+              <a:t> y </a:t>
+            </a:r>
+            <a:r>
+              <a:rPr lang="es-ES" dirty="0" err="1"/>
+              <a:t>Feature</a:t>
+            </a:r>
+            <a:endParaRPr lang="es-ES" dirty="0"/>
           </a:p>
         </p:txBody>
       </p:sp>
@@ -16287,7 +16521,7 @@
           <p:cNvPr id="5" name="Marcador de contenido 4">
             <a:extLst>
               <a:ext uri="{FF2B5EF4-FFF2-40B4-BE49-F238E27FC236}">
-                <a16:creationId xmlns:a16="http://schemas.microsoft.com/office/drawing/2014/main" id="{1A68CF83-704A-F35F-0827-A8D3F3D519FD}"/>
+                <a16:creationId xmlns:a16="http://schemas.microsoft.com/office/drawing/2014/main" id="{EEA7BC50-2244-B8DE-03E5-5E7C72563F3A}"/>
               </a:ext>
             </a:extLst>
           </p:cNvPr>
@@ -16300,25 +16534,80 @@
         </p:nvSpPr>
         <p:spPr/>
         <p:txBody>
-          <a:bodyPr/>
-          <a:lstStyle/>
-          <a:p>
-            <a:pPr marL="0" indent="0">
-              <a:buNone/>
-            </a:pPr>
-            <a:r>
-              <a:rPr lang="es-ES" dirty="0"/>
-              <a:t>Pero es preferible no perder el foco en el negocio…</a:t>
-            </a:r>
-          </a:p>
-        </p:txBody>
-      </p:sp>
-      <p:sp>
-        <p:nvSpPr>
-          <p:cNvPr id="8" name="Marcador de número de diapositiva 3">
-            <a:extLst>
-              <a:ext uri="{FF2B5EF4-FFF2-40B4-BE49-F238E27FC236}">
-                <a16:creationId xmlns:a16="http://schemas.microsoft.com/office/drawing/2014/main" id="{5FDC2F36-1FC2-507F-62D8-E1F8095A15DF}"/>
+          <a:bodyPr>
+            <a:normAutofit/>
+          </a:bodyPr>
+          <a:lstStyle/>
+          <a:p>
+            <a:r>
+              <a:rPr lang="es-ES" dirty="0"/>
+              <a:t>Video</a:t>
+            </a:r>
+          </a:p>
+          <a:p>
+            <a:pPr lvl="1"/>
+            <a:r>
+              <a:rPr lang="es-ES" dirty="0" err="1"/>
+              <a:t>Publish</a:t>
+            </a:r>
+            <a:endParaRPr lang="es-ES" dirty="0"/>
+          </a:p>
+          <a:p>
+            <a:pPr lvl="2"/>
+            <a:r>
+              <a:rPr lang="es-ES" dirty="0" err="1"/>
+              <a:t>application</a:t>
+            </a:r>
+            <a:endParaRPr lang="es-ES" dirty="0"/>
+          </a:p>
+          <a:p>
+            <a:pPr lvl="3"/>
+            <a:r>
+              <a:rPr lang="es-ES" dirty="0" err="1"/>
+              <a:t>PublishVideoApplicationService</a:t>
+            </a:r>
+            <a:endParaRPr lang="es-ES" dirty="0"/>
+          </a:p>
+          <a:p>
+            <a:pPr lvl="2"/>
+            <a:r>
+              <a:rPr lang="es-ES" dirty="0" err="1"/>
+              <a:t>domain</a:t>
+            </a:r>
+            <a:endParaRPr lang="es-ES" dirty="0"/>
+          </a:p>
+          <a:p>
+            <a:pPr lvl="3"/>
+            <a:r>
+              <a:rPr lang="es-ES" dirty="0" err="1"/>
+              <a:t>PublishVideoRepository</a:t>
+            </a:r>
+            <a:endParaRPr lang="es-ES" dirty="0"/>
+          </a:p>
+          <a:p>
+            <a:pPr lvl="2"/>
+            <a:r>
+              <a:rPr lang="es-ES" dirty="0" err="1"/>
+              <a:t>infrastructure</a:t>
+            </a:r>
+            <a:endParaRPr lang="es-ES" dirty="0"/>
+          </a:p>
+          <a:p>
+            <a:pPr lvl="3"/>
+            <a:r>
+              <a:rPr lang="es-ES" dirty="0" err="1"/>
+              <a:t>YouTubePublishVideoRepositoryAdapter</a:t>
+            </a:r>
+            <a:endParaRPr lang="es-ES" dirty="0"/>
+          </a:p>
+        </p:txBody>
+      </p:sp>
+      <p:sp>
+        <p:nvSpPr>
+          <p:cNvPr id="6" name="Marcador de número de diapositiva 3">
+            <a:extLst>
+              <a:ext uri="{FF2B5EF4-FFF2-40B4-BE49-F238E27FC236}">
+                <a16:creationId xmlns:a16="http://schemas.microsoft.com/office/drawing/2014/main" id="{1BB20320-0E41-828D-2BA4-39A74111C7AA}"/>
               </a:ext>
             </a:extLst>
           </p:cNvPr>
@@ -16355,7 +16644,7 @@
     </p:spTree>
     <p:extLst>
       <p:ext uri="{BB962C8B-B14F-4D97-AF65-F5344CB8AC3E}">
-        <p14:creationId xmlns:p14="http://schemas.microsoft.com/office/powerpoint/2010/main" val="272110872"/>
+        <p14:creationId xmlns:p14="http://schemas.microsoft.com/office/powerpoint/2010/main" val="3884166731"/>
       </p:ext>
     </p:extLst>
   </p:cSld>
@@ -16384,10 +16673,38 @@
       </p:grpSpPr>
       <p:sp>
         <p:nvSpPr>
-          <p:cNvPr id="3" name="Marcador de contenido 2">
-            <a:extLst>
-              <a:ext uri="{FF2B5EF4-FFF2-40B4-BE49-F238E27FC236}">
-                <a16:creationId xmlns:a16="http://schemas.microsoft.com/office/drawing/2014/main" id="{87EFDAE3-395C-A37B-102F-3E33CCDBC883}"/>
+          <p:cNvPr id="4" name="Título 3">
+            <a:extLst>
+              <a:ext uri="{FF2B5EF4-FFF2-40B4-BE49-F238E27FC236}">
+                <a16:creationId xmlns:a16="http://schemas.microsoft.com/office/drawing/2014/main" id="{87608981-4892-9105-E43C-8001955697FF}"/>
+              </a:ext>
+            </a:extLst>
+          </p:cNvPr>
+          <p:cNvSpPr>
+            <a:spLocks noGrp="1"/>
+          </p:cNvSpPr>
+          <p:nvPr>
+            <p:ph type="title"/>
+          </p:nvPr>
+        </p:nvSpPr>
+        <p:spPr/>
+        <p:txBody>
+          <a:bodyPr/>
+          <a:lstStyle/>
+          <a:p>
+            <a:r>
+              <a:rPr lang="es-ES" dirty="0"/>
+              <a:t>Gustos colores</a:t>
+            </a:r>
+          </a:p>
+        </p:txBody>
+      </p:sp>
+      <p:sp>
+        <p:nvSpPr>
+          <p:cNvPr id="5" name="Marcador de contenido 4">
+            <a:extLst>
+              <a:ext uri="{FF2B5EF4-FFF2-40B4-BE49-F238E27FC236}">
+                <a16:creationId xmlns:a16="http://schemas.microsoft.com/office/drawing/2014/main" id="{1A68CF83-704A-F35F-0827-A8D3F3D519FD}"/>
               </a:ext>
             </a:extLst>
           </p:cNvPr>
@@ -16398,206 +16715,18 @@
             <p:ph idx="1"/>
           </p:nvPr>
         </p:nvSpPr>
-        <p:spPr>
-          <a:xfrm>
-            <a:off x="838200" y="365125"/>
-            <a:ext cx="10515600" cy="5811838"/>
-          </a:xfrm>
-        </p:spPr>
-        <p:txBody>
-          <a:bodyPr>
-            <a:normAutofit fontScale="85000" lnSpcReduction="20000"/>
-          </a:bodyPr>
-          <a:lstStyle/>
-          <a:p>
-            <a:r>
-              <a:rPr lang="es-ES" dirty="0" err="1"/>
-              <a:t>boundedContext</a:t>
-            </a:r>
-            <a:endParaRPr lang="es-ES" dirty="0"/>
-          </a:p>
-          <a:p>
-            <a:pPr lvl="1"/>
-            <a:r>
-              <a:rPr lang="es-ES" dirty="0" err="1"/>
-              <a:t>Feature</a:t>
-            </a:r>
-            <a:endParaRPr lang="es-ES" dirty="0"/>
-          </a:p>
-          <a:p>
-            <a:pPr lvl="2"/>
-            <a:r>
-              <a:rPr lang="es-ES" dirty="0" err="1"/>
-              <a:t>application</a:t>
-            </a:r>
-            <a:endParaRPr lang="es-ES" dirty="0"/>
-          </a:p>
-          <a:p>
-            <a:pPr lvl="3"/>
-            <a:r>
-              <a:rPr lang="es-ES" dirty="0" err="1"/>
-              <a:t>UseCase</a:t>
-            </a:r>
-            <a:endParaRPr lang="es-ES" dirty="0"/>
-          </a:p>
-          <a:p>
-            <a:pPr lvl="4"/>
-            <a:r>
-              <a:rPr lang="es-ES" dirty="0" err="1"/>
-              <a:t>UseCaseApplicationService</a:t>
-            </a:r>
-            <a:endParaRPr lang="es-ES" dirty="0"/>
-          </a:p>
-          <a:p>
-            <a:pPr lvl="4"/>
-            <a:r>
-              <a:rPr lang="es-ES" dirty="0" err="1"/>
-              <a:t>Command</a:t>
-            </a:r>
-            <a:endParaRPr lang="es-ES" dirty="0"/>
-          </a:p>
-          <a:p>
-            <a:pPr lvl="4"/>
-            <a:r>
-              <a:rPr lang="es-ES" dirty="0" err="1"/>
-              <a:t>Handler</a:t>
-            </a:r>
-            <a:endParaRPr lang="es-ES" dirty="0"/>
-          </a:p>
-          <a:p>
-            <a:pPr lvl="2"/>
-            <a:r>
-              <a:rPr lang="es-ES" dirty="0" err="1"/>
-              <a:t>domain</a:t>
-            </a:r>
-            <a:endParaRPr lang="es-ES" dirty="0"/>
-          </a:p>
-          <a:p>
-            <a:pPr lvl="3"/>
-            <a:r>
-              <a:rPr lang="es-ES" dirty="0" err="1"/>
-              <a:t>AdapterRepository</a:t>
-            </a:r>
-            <a:endParaRPr lang="es-ES" dirty="0"/>
-          </a:p>
-          <a:p>
-            <a:pPr lvl="3"/>
-            <a:r>
-              <a:rPr lang="es-ES"/>
-              <a:t>UseCaseDomainService</a:t>
-            </a:r>
-            <a:endParaRPr lang="es-ES" dirty="0"/>
-          </a:p>
-          <a:p>
-            <a:pPr lvl="2"/>
-            <a:r>
-              <a:rPr lang="es-ES" dirty="0" err="1"/>
-              <a:t>infrastructure</a:t>
-            </a:r>
-            <a:endParaRPr lang="es-ES" dirty="0"/>
-          </a:p>
-          <a:p>
-            <a:pPr lvl="3"/>
-            <a:r>
-              <a:rPr lang="es-ES" dirty="0" err="1"/>
-              <a:t>controller</a:t>
-            </a:r>
-            <a:endParaRPr lang="es-ES" dirty="0"/>
-          </a:p>
-          <a:p>
-            <a:pPr lvl="4"/>
-            <a:r>
-              <a:rPr lang="es-ES" dirty="0" err="1"/>
-              <a:t>UseCaseController</a:t>
-            </a:r>
-            <a:endParaRPr lang="es-ES" dirty="0"/>
-          </a:p>
-          <a:p>
-            <a:pPr lvl="3"/>
-            <a:r>
-              <a:rPr lang="es-ES" dirty="0" err="1"/>
-              <a:t>mapper</a:t>
-            </a:r>
-            <a:endParaRPr lang="es-ES" dirty="0"/>
-          </a:p>
-          <a:p>
-            <a:pPr lvl="4"/>
-            <a:r>
-              <a:rPr lang="es-ES" dirty="0" err="1"/>
-              <a:t>InfraToDomainModelMapper</a:t>
-            </a:r>
-            <a:endParaRPr lang="es-ES" dirty="0"/>
-          </a:p>
-          <a:p>
-            <a:pPr lvl="3"/>
-            <a:r>
-              <a:rPr lang="es-ES" dirty="0" err="1"/>
-              <a:t>EventPublisherImpl</a:t>
-            </a:r>
-            <a:endParaRPr lang="es-ES" dirty="0"/>
-          </a:p>
-          <a:p>
-            <a:r>
-              <a:rPr lang="es-ES" dirty="0" err="1"/>
-              <a:t>shared</a:t>
-            </a:r>
-            <a:r>
-              <a:rPr lang="es-ES" dirty="0"/>
-              <a:t> - compartido entre </a:t>
-            </a:r>
-            <a:r>
-              <a:rPr lang="es-ES" dirty="0" err="1"/>
-              <a:t>bounded</a:t>
-            </a:r>
-            <a:r>
-              <a:rPr lang="es-ES" dirty="0"/>
-              <a:t> </a:t>
-            </a:r>
-            <a:r>
-              <a:rPr lang="es-ES" dirty="0" err="1"/>
-              <a:t>contexts</a:t>
-            </a:r>
-            <a:endParaRPr lang="es-ES" dirty="0"/>
-          </a:p>
-          <a:p>
-            <a:pPr lvl="1"/>
-            <a:r>
-              <a:rPr lang="es-ES" dirty="0" err="1"/>
-              <a:t>application</a:t>
-            </a:r>
-            <a:endParaRPr lang="es-ES" dirty="0"/>
-          </a:p>
-          <a:p>
-            <a:pPr lvl="1"/>
-            <a:r>
-              <a:rPr lang="es-ES" dirty="0" err="1"/>
-              <a:t>domain</a:t>
-            </a:r>
-            <a:endParaRPr lang="es-ES" dirty="0"/>
-          </a:p>
-          <a:p>
-            <a:pPr lvl="1"/>
-            <a:r>
-              <a:rPr lang="es-ES" dirty="0" err="1"/>
-              <a:t>infrastructure</a:t>
-            </a:r>
-            <a:endParaRPr lang="es-ES" dirty="0"/>
-          </a:p>
-          <a:p>
-            <a:pPr lvl="2"/>
-            <a:r>
-              <a:rPr lang="es-ES" dirty="0" err="1"/>
-              <a:t>persistence</a:t>
-            </a:r>
-            <a:endParaRPr lang="es-ES" dirty="0"/>
-          </a:p>
-          <a:p>
-            <a:pPr lvl="3"/>
-            <a:r>
-              <a:rPr lang="es-ES" dirty="0" err="1"/>
-              <a:t>AdapterRepositoryImpl</a:t>
-            </a:r>
-            <a:endParaRPr lang="es-ES" dirty="0"/>
+        <p:spPr/>
+        <p:txBody>
+          <a:bodyPr/>
+          <a:lstStyle/>
+          <a:p>
+            <a:pPr marL="0" indent="0">
+              <a:buNone/>
+            </a:pPr>
+            <a:r>
+              <a:rPr lang="es-ES" dirty="0"/>
+              <a:t>Pero es preferible no perder el foco en el negocio…</a:t>
+            </a:r>
           </a:p>
         </p:txBody>
       </p:sp>
@@ -16606,7 +16735,7 @@
           <p:cNvPr id="8" name="Marcador de número de diapositiva 3">
             <a:extLst>
               <a:ext uri="{FF2B5EF4-FFF2-40B4-BE49-F238E27FC236}">
-                <a16:creationId xmlns:a16="http://schemas.microsoft.com/office/drawing/2014/main" id="{7D50FE96-24CA-1207-F08D-6CDF9EAC0AE2}"/>
+                <a16:creationId xmlns:a16="http://schemas.microsoft.com/office/drawing/2014/main" id="{5FDC2F36-1FC2-507F-62D8-E1F8095A15DF}"/>
               </a:ext>
             </a:extLst>
           </p:cNvPr>
@@ -16643,7 +16772,7 @@
     </p:spTree>
     <p:extLst>
       <p:ext uri="{BB962C8B-B14F-4D97-AF65-F5344CB8AC3E}">
-        <p14:creationId xmlns:p14="http://schemas.microsoft.com/office/powerpoint/2010/main" val="1273833830"/>
+        <p14:creationId xmlns:p14="http://schemas.microsoft.com/office/powerpoint/2010/main" val="272110872"/>
       </p:ext>
     </p:extLst>
   </p:cSld>
@@ -16672,38 +16801,229 @@
       </p:grpSpPr>
       <p:sp>
         <p:nvSpPr>
-          <p:cNvPr id="5" name="Título 4">
-            <a:extLst>
-              <a:ext uri="{FF2B5EF4-FFF2-40B4-BE49-F238E27FC236}">
-                <a16:creationId xmlns:a16="http://schemas.microsoft.com/office/drawing/2014/main" id="{B54B667B-0811-B497-CD88-EC9DD604AE2A}"/>
-              </a:ext>
-            </a:extLst>
-          </p:cNvPr>
-          <p:cNvSpPr>
-            <a:spLocks noGrp="1"/>
-          </p:cNvSpPr>
-          <p:nvPr>
-            <p:ph type="title"/>
-          </p:nvPr>
-        </p:nvSpPr>
-        <p:spPr/>
-        <p:txBody>
-          <a:bodyPr/>
-          <a:lstStyle/>
-          <a:p>
-            <a:r>
-              <a:rPr lang="es-ES" dirty="0"/>
-              <a:t>Hemos visto…</a:t>
-            </a:r>
-          </a:p>
-        </p:txBody>
-      </p:sp>
-      <p:sp>
-        <p:nvSpPr>
-          <p:cNvPr id="4" name="Marcador de número de diapositiva 3">
-            <a:extLst>
-              <a:ext uri="{FF2B5EF4-FFF2-40B4-BE49-F238E27FC236}">
-                <a16:creationId xmlns:a16="http://schemas.microsoft.com/office/drawing/2014/main" id="{585889BC-DA67-7DFE-3E2F-BD7086B6882D}"/>
+          <p:cNvPr id="3" name="Marcador de contenido 2">
+            <a:extLst>
+              <a:ext uri="{FF2B5EF4-FFF2-40B4-BE49-F238E27FC236}">
+                <a16:creationId xmlns:a16="http://schemas.microsoft.com/office/drawing/2014/main" id="{87EFDAE3-395C-A37B-102F-3E33CCDBC883}"/>
+              </a:ext>
+            </a:extLst>
+          </p:cNvPr>
+          <p:cNvSpPr>
+            <a:spLocks noGrp="1"/>
+          </p:cNvSpPr>
+          <p:nvPr>
+            <p:ph idx="1"/>
+          </p:nvPr>
+        </p:nvSpPr>
+        <p:spPr>
+          <a:xfrm>
+            <a:off x="838200" y="365125"/>
+            <a:ext cx="10515600" cy="5811838"/>
+          </a:xfrm>
+        </p:spPr>
+        <p:txBody>
+          <a:bodyPr>
+            <a:normAutofit fontScale="85000" lnSpcReduction="20000"/>
+          </a:bodyPr>
+          <a:lstStyle/>
+          <a:p>
+            <a:r>
+              <a:rPr lang="es-ES" dirty="0" err="1"/>
+              <a:t>boundedContext</a:t>
+            </a:r>
+            <a:endParaRPr lang="es-ES" dirty="0"/>
+          </a:p>
+          <a:p>
+            <a:pPr lvl="1"/>
+            <a:r>
+              <a:rPr lang="es-ES" dirty="0" err="1"/>
+              <a:t>Feature</a:t>
+            </a:r>
+            <a:endParaRPr lang="es-ES" dirty="0"/>
+          </a:p>
+          <a:p>
+            <a:pPr lvl="2"/>
+            <a:r>
+              <a:rPr lang="es-ES" dirty="0" err="1"/>
+              <a:t>application</a:t>
+            </a:r>
+            <a:endParaRPr lang="es-ES" dirty="0"/>
+          </a:p>
+          <a:p>
+            <a:pPr lvl="3"/>
+            <a:r>
+              <a:rPr lang="es-ES" dirty="0" err="1"/>
+              <a:t>UseCase</a:t>
+            </a:r>
+            <a:endParaRPr lang="es-ES" dirty="0"/>
+          </a:p>
+          <a:p>
+            <a:pPr lvl="4"/>
+            <a:r>
+              <a:rPr lang="es-ES" dirty="0" err="1"/>
+              <a:t>UseCaseApplicationService</a:t>
+            </a:r>
+            <a:endParaRPr lang="es-ES" dirty="0"/>
+          </a:p>
+          <a:p>
+            <a:pPr lvl="4"/>
+            <a:r>
+              <a:rPr lang="es-ES" dirty="0" err="1"/>
+              <a:t>Command</a:t>
+            </a:r>
+            <a:endParaRPr lang="es-ES" dirty="0"/>
+          </a:p>
+          <a:p>
+            <a:pPr lvl="4"/>
+            <a:r>
+              <a:rPr lang="es-ES" dirty="0" err="1"/>
+              <a:t>Handler</a:t>
+            </a:r>
+            <a:endParaRPr lang="es-ES" dirty="0"/>
+          </a:p>
+          <a:p>
+            <a:pPr lvl="2"/>
+            <a:r>
+              <a:rPr lang="es-ES" dirty="0" err="1"/>
+              <a:t>domain</a:t>
+            </a:r>
+            <a:endParaRPr lang="es-ES" dirty="0"/>
+          </a:p>
+          <a:p>
+            <a:pPr lvl="3"/>
+            <a:r>
+              <a:rPr lang="es-ES" dirty="0" err="1"/>
+              <a:t>AdapterRepository</a:t>
+            </a:r>
+            <a:endParaRPr lang="es-ES" dirty="0"/>
+          </a:p>
+          <a:p>
+            <a:pPr lvl="3"/>
+            <a:r>
+              <a:rPr lang="es-ES"/>
+              <a:t>UseCaseDomainService</a:t>
+            </a:r>
+            <a:endParaRPr lang="es-ES" dirty="0"/>
+          </a:p>
+          <a:p>
+            <a:pPr lvl="2"/>
+            <a:r>
+              <a:rPr lang="es-ES" dirty="0" err="1"/>
+              <a:t>infrastructure</a:t>
+            </a:r>
+            <a:endParaRPr lang="es-ES" dirty="0"/>
+          </a:p>
+          <a:p>
+            <a:pPr lvl="3"/>
+            <a:r>
+              <a:rPr lang="es-ES" dirty="0" err="1"/>
+              <a:t>controller</a:t>
+            </a:r>
+            <a:endParaRPr lang="es-ES" dirty="0"/>
+          </a:p>
+          <a:p>
+            <a:pPr lvl="4"/>
+            <a:r>
+              <a:rPr lang="es-ES" dirty="0" err="1"/>
+              <a:t>UseCaseController</a:t>
+            </a:r>
+            <a:endParaRPr lang="es-ES" dirty="0"/>
+          </a:p>
+          <a:p>
+            <a:pPr lvl="3"/>
+            <a:r>
+              <a:rPr lang="es-ES" dirty="0" err="1"/>
+              <a:t>mapper</a:t>
+            </a:r>
+            <a:endParaRPr lang="es-ES" dirty="0"/>
+          </a:p>
+          <a:p>
+            <a:pPr lvl="4"/>
+            <a:r>
+              <a:rPr lang="es-ES" dirty="0" err="1"/>
+              <a:t>InfraToDomainModelMapper</a:t>
+            </a:r>
+            <a:endParaRPr lang="es-ES" dirty="0"/>
+          </a:p>
+          <a:p>
+            <a:pPr lvl="3"/>
+            <a:r>
+              <a:rPr lang="es-ES" dirty="0" err="1"/>
+              <a:t>EventPublisherImpl</a:t>
+            </a:r>
+            <a:endParaRPr lang="es-ES" dirty="0"/>
+          </a:p>
+          <a:p>
+            <a:r>
+              <a:rPr lang="es-ES" dirty="0" err="1"/>
+              <a:t>shared</a:t>
+            </a:r>
+            <a:r>
+              <a:rPr lang="es-ES" dirty="0"/>
+              <a:t> - compartido entre </a:t>
+            </a:r>
+            <a:r>
+              <a:rPr lang="es-ES" dirty="0" err="1"/>
+              <a:t>bounded</a:t>
+            </a:r>
+            <a:r>
+              <a:rPr lang="es-ES" dirty="0"/>
+              <a:t> </a:t>
+            </a:r>
+            <a:r>
+              <a:rPr lang="es-ES" dirty="0" err="1"/>
+              <a:t>contexts</a:t>
+            </a:r>
+            <a:endParaRPr lang="es-ES" dirty="0"/>
+          </a:p>
+          <a:p>
+            <a:pPr lvl="1"/>
+            <a:r>
+              <a:rPr lang="es-ES" dirty="0" err="1"/>
+              <a:t>application</a:t>
+            </a:r>
+            <a:endParaRPr lang="es-ES" dirty="0"/>
+          </a:p>
+          <a:p>
+            <a:pPr lvl="1"/>
+            <a:r>
+              <a:rPr lang="es-ES" dirty="0" err="1"/>
+              <a:t>domain</a:t>
+            </a:r>
+            <a:endParaRPr lang="es-ES" dirty="0"/>
+          </a:p>
+          <a:p>
+            <a:pPr lvl="1"/>
+            <a:r>
+              <a:rPr lang="es-ES" dirty="0" err="1"/>
+              <a:t>infrastructure</a:t>
+            </a:r>
+            <a:endParaRPr lang="es-ES" dirty="0"/>
+          </a:p>
+          <a:p>
+            <a:pPr lvl="2"/>
+            <a:r>
+              <a:rPr lang="es-ES" dirty="0" err="1"/>
+              <a:t>persistence</a:t>
+            </a:r>
+            <a:endParaRPr lang="es-ES" dirty="0"/>
+          </a:p>
+          <a:p>
+            <a:pPr lvl="3"/>
+            <a:r>
+              <a:rPr lang="es-ES" dirty="0" err="1"/>
+              <a:t>AdapterRepositoryImpl</a:t>
+            </a:r>
+            <a:endParaRPr lang="es-ES" dirty="0"/>
+          </a:p>
+        </p:txBody>
+      </p:sp>
+      <p:sp>
+        <p:nvSpPr>
+          <p:cNvPr id="8" name="Marcador de número de diapositiva 3">
+            <a:extLst>
+              <a:ext uri="{FF2B5EF4-FFF2-40B4-BE49-F238E27FC236}">
+                <a16:creationId xmlns:a16="http://schemas.microsoft.com/office/drawing/2014/main" id="{7D50FE96-24CA-1207-F08D-6CDF9EAC0AE2}"/>
               </a:ext>
             </a:extLst>
           </p:cNvPr>
@@ -16714,13 +17034,18 @@
             <p:ph type="sldNum" sz="quarter" idx="4"/>
           </p:nvPr>
         </p:nvSpPr>
-        <p:spPr/>
-        <p:txBody>
-          <a:bodyPr/>
-          <a:lstStyle/>
-          <a:p>
-            <a:r>
-              <a:rPr lang="es-ES"/>
+        <p:spPr>
+          <a:xfrm>
+            <a:off x="8610600" y="6356350"/>
+            <a:ext cx="2743200" cy="365125"/>
+          </a:xfrm>
+        </p:spPr>
+        <p:txBody>
+          <a:bodyPr/>
+          <a:lstStyle/>
+          <a:p>
+            <a:r>
+              <a:rPr lang="es-ES" dirty="0"/>
               <a:t>09/2024 | Pepe Fabra Valverde | </a:t>
             </a:r>
             <a:fld id="{B87D0AB6-8E4A-4BD5-8779-ABED7EE2B505}" type="slidenum">
@@ -16735,7 +17060,7 @@
     </p:spTree>
     <p:extLst>
       <p:ext uri="{BB962C8B-B14F-4D97-AF65-F5344CB8AC3E}">
-        <p14:creationId xmlns:p14="http://schemas.microsoft.com/office/powerpoint/2010/main" val="686276018"/>
+        <p14:creationId xmlns:p14="http://schemas.microsoft.com/office/powerpoint/2010/main" val="1273833830"/>
       </p:ext>
     </p:extLst>
   </p:cSld>
@@ -16764,10 +17089,10 @@
       </p:grpSpPr>
       <p:sp>
         <p:nvSpPr>
-          <p:cNvPr id="2" name="Título 1">
-            <a:extLst>
-              <a:ext uri="{FF2B5EF4-FFF2-40B4-BE49-F238E27FC236}">
-                <a16:creationId xmlns:a16="http://schemas.microsoft.com/office/drawing/2014/main" id="{E9D9049C-41EC-86A4-B5F0-E8C82AAFE075}"/>
+          <p:cNvPr id="5" name="Título 4">
+            <a:extLst>
+              <a:ext uri="{FF2B5EF4-FFF2-40B4-BE49-F238E27FC236}">
+                <a16:creationId xmlns:a16="http://schemas.microsoft.com/office/drawing/2014/main" id="{B54B667B-0811-B497-CD88-EC9DD604AE2A}"/>
               </a:ext>
             </a:extLst>
           </p:cNvPr>
@@ -16792,18 +17117,18 @@
       </p:sp>
       <p:sp>
         <p:nvSpPr>
-          <p:cNvPr id="3" name="Marcador de contenido 2">
-            <a:extLst>
-              <a:ext uri="{FF2B5EF4-FFF2-40B4-BE49-F238E27FC236}">
-                <a16:creationId xmlns:a16="http://schemas.microsoft.com/office/drawing/2014/main" id="{0883C374-3CF1-FA98-6A51-9FED2017DEDE}"/>
-              </a:ext>
-            </a:extLst>
-          </p:cNvPr>
-          <p:cNvSpPr>
-            <a:spLocks noGrp="1"/>
-          </p:cNvSpPr>
-          <p:nvPr>
-            <p:ph idx="1"/>
+          <p:cNvPr id="4" name="Marcador de número de diapositiva 3">
+            <a:extLst>
+              <a:ext uri="{FF2B5EF4-FFF2-40B4-BE49-F238E27FC236}">
+                <a16:creationId xmlns:a16="http://schemas.microsoft.com/office/drawing/2014/main" id="{585889BC-DA67-7DFE-3E2F-BD7086B6882D}"/>
+              </a:ext>
+            </a:extLst>
+          </p:cNvPr>
+          <p:cNvSpPr>
+            <a:spLocks noGrp="1"/>
+          </p:cNvSpPr>
+          <p:nvPr>
+            <p:ph type="sldNum" sz="quarter" idx="4"/>
           </p:nvPr>
         </p:nvSpPr>
         <p:spPr/>
@@ -16812,47 +17137,7 @@
           <a:lstStyle/>
           <a:p>
             <a:r>
-              <a:rPr lang="es-ES" dirty="0"/>
-              <a:t>DDD -&gt; lo técnico se adapta al negocio</a:t>
-            </a:r>
-          </a:p>
-          <a:p>
-            <a:pPr lvl="1"/>
-            <a:r>
-              <a:rPr lang="es-ES" dirty="0"/>
-              <a:t>Se utiliza lenguaje de negocio para describir lo técnico, no al revés</a:t>
-            </a:r>
-          </a:p>
-        </p:txBody>
-      </p:sp>
-      <p:sp>
-        <p:nvSpPr>
-          <p:cNvPr id="6" name="Marcador de número de diapositiva 3">
-            <a:extLst>
-              <a:ext uri="{FF2B5EF4-FFF2-40B4-BE49-F238E27FC236}">
-                <a16:creationId xmlns:a16="http://schemas.microsoft.com/office/drawing/2014/main" id="{7C42A0B9-B6E4-7D3F-0ED3-9B0F9BCB70CD}"/>
-              </a:ext>
-            </a:extLst>
-          </p:cNvPr>
-          <p:cNvSpPr>
-            <a:spLocks noGrp="1"/>
-          </p:cNvSpPr>
-          <p:nvPr>
-            <p:ph type="sldNum" sz="quarter" idx="4"/>
-          </p:nvPr>
-        </p:nvSpPr>
-        <p:spPr>
-          <a:xfrm>
-            <a:off x="8610600" y="6356350"/>
-            <a:ext cx="2743200" cy="365125"/>
-          </a:xfrm>
-        </p:spPr>
-        <p:txBody>
-          <a:bodyPr/>
-          <a:lstStyle/>
-          <a:p>
-            <a:r>
-              <a:rPr lang="es-ES" dirty="0"/>
+              <a:rPr lang="es-ES"/>
               <a:t>09/2024 | Pepe Fabra Valverde | </a:t>
             </a:r>
             <a:fld id="{B87D0AB6-8E4A-4BD5-8779-ABED7EE2B505}" type="slidenum">
@@ -16867,7 +17152,7 @@
     </p:spTree>
     <p:extLst>
       <p:ext uri="{BB962C8B-B14F-4D97-AF65-F5344CB8AC3E}">
-        <p14:creationId xmlns:p14="http://schemas.microsoft.com/office/powerpoint/2010/main" val="1020158529"/>
+        <p14:creationId xmlns:p14="http://schemas.microsoft.com/office/powerpoint/2010/main" val="686276018"/>
       </p:ext>
     </p:extLst>
   </p:cSld>
@@ -16955,27 +17240,6 @@
               <a:t>Se utiliza lenguaje de negocio para describir lo técnico, no al revés</a:t>
             </a:r>
           </a:p>
-          <a:p>
-            <a:r>
-              <a:rPr lang="es-ES" dirty="0"/>
-              <a:t>Arquitectura Hexagonal</a:t>
-            </a:r>
-          </a:p>
-          <a:p>
-            <a:pPr lvl="1"/>
-            <a:r>
-              <a:rPr lang="es-ES" dirty="0"/>
-              <a:t>Infraestructura -&gt; Aplicación (caso de uso) -&gt; Dominio</a:t>
-            </a:r>
-          </a:p>
-          <a:p>
-            <a:pPr lvl="1"/>
-            <a:r>
-              <a:rPr lang="es-ES" dirty="0" err="1"/>
-              <a:t>Testing</a:t>
-            </a:r>
-            <a:endParaRPr lang="es-ES" dirty="0"/>
-          </a:p>
         </p:txBody>
       </p:sp>
       <p:sp>
@@ -17020,7 +17284,7 @@
     </p:spTree>
     <p:extLst>
       <p:ext uri="{BB962C8B-B14F-4D97-AF65-F5344CB8AC3E}">
-        <p14:creationId xmlns:p14="http://schemas.microsoft.com/office/powerpoint/2010/main" val="2732434422"/>
+        <p14:creationId xmlns:p14="http://schemas.microsoft.com/office/powerpoint/2010/main" val="1020158529"/>
       </p:ext>
     </p:extLst>
   </p:cSld>
@@ -17049,6 +17313,159 @@
       </p:grpSpPr>
       <p:sp>
         <p:nvSpPr>
+          <p:cNvPr id="2" name="Título 1">
+            <a:extLst>
+              <a:ext uri="{FF2B5EF4-FFF2-40B4-BE49-F238E27FC236}">
+                <a16:creationId xmlns:a16="http://schemas.microsoft.com/office/drawing/2014/main" id="{E9D9049C-41EC-86A4-B5F0-E8C82AAFE075}"/>
+              </a:ext>
+            </a:extLst>
+          </p:cNvPr>
+          <p:cNvSpPr>
+            <a:spLocks noGrp="1"/>
+          </p:cNvSpPr>
+          <p:nvPr>
+            <p:ph type="title"/>
+          </p:nvPr>
+        </p:nvSpPr>
+        <p:spPr/>
+        <p:txBody>
+          <a:bodyPr/>
+          <a:lstStyle/>
+          <a:p>
+            <a:r>
+              <a:rPr lang="es-ES" dirty="0"/>
+              <a:t>Hemos visto…</a:t>
+            </a:r>
+          </a:p>
+        </p:txBody>
+      </p:sp>
+      <p:sp>
+        <p:nvSpPr>
+          <p:cNvPr id="3" name="Marcador de contenido 2">
+            <a:extLst>
+              <a:ext uri="{FF2B5EF4-FFF2-40B4-BE49-F238E27FC236}">
+                <a16:creationId xmlns:a16="http://schemas.microsoft.com/office/drawing/2014/main" id="{0883C374-3CF1-FA98-6A51-9FED2017DEDE}"/>
+              </a:ext>
+            </a:extLst>
+          </p:cNvPr>
+          <p:cNvSpPr>
+            <a:spLocks noGrp="1"/>
+          </p:cNvSpPr>
+          <p:nvPr>
+            <p:ph idx="1"/>
+          </p:nvPr>
+        </p:nvSpPr>
+        <p:spPr/>
+        <p:txBody>
+          <a:bodyPr/>
+          <a:lstStyle/>
+          <a:p>
+            <a:r>
+              <a:rPr lang="es-ES" dirty="0"/>
+              <a:t>DDD -&gt; lo técnico se adapta al negocio</a:t>
+            </a:r>
+          </a:p>
+          <a:p>
+            <a:pPr lvl="1"/>
+            <a:r>
+              <a:rPr lang="es-ES" dirty="0"/>
+              <a:t>Se utiliza lenguaje de negocio para describir lo técnico, no al revés</a:t>
+            </a:r>
+          </a:p>
+          <a:p>
+            <a:r>
+              <a:rPr lang="es-ES" dirty="0"/>
+              <a:t>Arquitectura Hexagonal</a:t>
+            </a:r>
+          </a:p>
+          <a:p>
+            <a:pPr lvl="1"/>
+            <a:r>
+              <a:rPr lang="es-ES" dirty="0"/>
+              <a:t>Infraestructura -&gt; Aplicación (caso de uso) -&gt; Dominio</a:t>
+            </a:r>
+          </a:p>
+          <a:p>
+            <a:pPr lvl="1"/>
+            <a:r>
+              <a:rPr lang="es-ES" dirty="0" err="1"/>
+              <a:t>Testing</a:t>
+            </a:r>
+            <a:endParaRPr lang="es-ES" dirty="0"/>
+          </a:p>
+        </p:txBody>
+      </p:sp>
+      <p:sp>
+        <p:nvSpPr>
+          <p:cNvPr id="6" name="Marcador de número de diapositiva 3">
+            <a:extLst>
+              <a:ext uri="{FF2B5EF4-FFF2-40B4-BE49-F238E27FC236}">
+                <a16:creationId xmlns:a16="http://schemas.microsoft.com/office/drawing/2014/main" id="{7C42A0B9-B6E4-7D3F-0ED3-9B0F9BCB70CD}"/>
+              </a:ext>
+            </a:extLst>
+          </p:cNvPr>
+          <p:cNvSpPr>
+            <a:spLocks noGrp="1"/>
+          </p:cNvSpPr>
+          <p:nvPr>
+            <p:ph type="sldNum" sz="quarter" idx="4"/>
+          </p:nvPr>
+        </p:nvSpPr>
+        <p:spPr>
+          <a:xfrm>
+            <a:off x="8610600" y="6356350"/>
+            <a:ext cx="2743200" cy="365125"/>
+          </a:xfrm>
+        </p:spPr>
+        <p:txBody>
+          <a:bodyPr/>
+          <a:lstStyle/>
+          <a:p>
+            <a:r>
+              <a:rPr lang="es-ES" dirty="0"/>
+              <a:t>09/2024 | Pepe Fabra Valverde | </a:t>
+            </a:r>
+            <a:fld id="{B87D0AB6-8E4A-4BD5-8779-ABED7EE2B505}" type="slidenum">
+              <a:rPr lang="es-ES" smtClean="0"/>
+              <a:pPr/>
+              <a:t>75</a:t>
+            </a:fld>
+            <a:endParaRPr lang="es-ES" dirty="0"/>
+          </a:p>
+        </p:txBody>
+      </p:sp>
+    </p:spTree>
+    <p:extLst>
+      <p:ext uri="{BB962C8B-B14F-4D97-AF65-F5344CB8AC3E}">
+        <p14:creationId xmlns:p14="http://schemas.microsoft.com/office/powerpoint/2010/main" val="2732434422"/>
+      </p:ext>
+    </p:extLst>
+  </p:cSld>
+  <p:clrMapOvr>
+    <a:masterClrMapping/>
+  </p:clrMapOvr>
+</p:sld>
+</file>
+
+<file path=ppt/slides/slide76.xml><?xml version="1.0" encoding="utf-8"?>
+<p:sld xmlns:a="http://schemas.openxmlformats.org/drawingml/2006/main" xmlns:r="http://schemas.openxmlformats.org/officeDocument/2006/relationships" xmlns:p="http://schemas.openxmlformats.org/presentationml/2006/main">
+  <p:cSld>
+    <p:spTree>
+      <p:nvGrpSpPr>
+        <p:cNvPr id="1" name=""/>
+        <p:cNvGrpSpPr/>
+        <p:nvPr/>
+      </p:nvGrpSpPr>
+      <p:grpSpPr>
+        <a:xfrm>
+          <a:off x="0" y="0"/>
+          <a:ext cx="0" cy="0"/>
+          <a:chOff x="0" y="0"/>
+          <a:chExt cx="0" cy="0"/>
+        </a:xfrm>
+      </p:grpSpPr>
+      <p:sp>
+        <p:nvSpPr>
           <p:cNvPr id="7" name="Elipse 6">
             <a:extLst>
               <a:ext uri="{FF2B5EF4-FFF2-40B4-BE49-F238E27FC236}">
@@ -17070,6 +17487,13 @@
           <a:ln>
             <a:noFill/>
           </a:ln>
+          <a:effectLst>
+            <a:outerShdw blurRad="50800" dist="38100" dir="5400000" algn="t" rotWithShape="0">
+              <a:prstClr val="black">
+                <a:alpha val="40000"/>
+              </a:prstClr>
+            </a:outerShdw>
+          </a:effectLst>
         </p:spPr>
         <p:style>
           <a:lnRef idx="2">
@@ -17148,7 +17572,7 @@
 </p:sld>
 </file>
 
-<file path=ppt/slides/slide76.xml><?xml version="1.0" encoding="utf-8"?>
+<file path=ppt/slides/slide77.xml><?xml version="1.0" encoding="utf-8"?>
 <p:sld xmlns:a="http://schemas.openxmlformats.org/drawingml/2006/main" xmlns:r="http://schemas.openxmlformats.org/officeDocument/2006/relationships" xmlns:p="http://schemas.openxmlformats.org/presentationml/2006/main">
   <p:cSld>
     <p:spTree>
@@ -17247,6 +17671,13 @@
           <a:ln>
             <a:noFill/>
           </a:ln>
+          <a:effectLst>
+            <a:outerShdw blurRad="50800" dist="38100" dir="5400000" algn="t" rotWithShape="0">
+              <a:prstClr val="black">
+                <a:alpha val="40000"/>
+              </a:prstClr>
+            </a:outerShdw>
+          </a:effectLst>
         </p:spPr>
         <p:style>
           <a:lnRef idx="2">
@@ -17408,7 +17839,7 @@
 </p:sld>
 </file>
 
-<file path=ppt/slides/slide77.xml><?xml version="1.0" encoding="utf-8"?>
+<file path=ppt/slides/slide78.xml><?xml version="1.0" encoding="utf-8"?>
 <p:sld xmlns:a="http://schemas.openxmlformats.org/drawingml/2006/main" xmlns:r="http://schemas.openxmlformats.org/officeDocument/2006/relationships" xmlns:p="http://schemas.openxmlformats.org/presentationml/2006/main">
   <p:cSld>
     <p:spTree>
@@ -17566,6 +17997,13 @@
           <a:ln>
             <a:noFill/>
           </a:ln>
+          <a:effectLst>
+            <a:outerShdw blurRad="50800" dist="38100" dir="5400000" algn="t" rotWithShape="0">
+              <a:prstClr val="black">
+                <a:alpha val="40000"/>
+              </a:prstClr>
+            </a:outerShdw>
+          </a:effectLst>
         </p:spPr>
         <p:style>
           <a:lnRef idx="2">
@@ -17810,202 +18248,6 @@
 </p:sld>
 </file>
 
-<file path=ppt/slides/slide78.xml><?xml version="1.0" encoding="utf-8"?>
-<p:sld xmlns:a="http://schemas.openxmlformats.org/drawingml/2006/main" xmlns:r="http://schemas.openxmlformats.org/officeDocument/2006/relationships" xmlns:p="http://schemas.openxmlformats.org/presentationml/2006/main">
-  <p:cSld>
-    <p:spTree>
-      <p:nvGrpSpPr>
-        <p:cNvPr id="1" name=""/>
-        <p:cNvGrpSpPr/>
-        <p:nvPr/>
-      </p:nvGrpSpPr>
-      <p:grpSpPr>
-        <a:xfrm>
-          <a:off x="0" y="0"/>
-          <a:ext cx="0" cy="0"/>
-          <a:chOff x="0" y="0"/>
-          <a:chExt cx="0" cy="0"/>
-        </a:xfrm>
-      </p:grpSpPr>
-      <p:sp>
-        <p:nvSpPr>
-          <p:cNvPr id="2" name="Título 1">
-            <a:extLst>
-              <a:ext uri="{FF2B5EF4-FFF2-40B4-BE49-F238E27FC236}">
-                <a16:creationId xmlns:a16="http://schemas.microsoft.com/office/drawing/2014/main" id="{AF676BC6-8806-EF5B-B32D-B40D05730EB3}"/>
-              </a:ext>
-            </a:extLst>
-          </p:cNvPr>
-          <p:cNvSpPr>
-            <a:spLocks noGrp="1"/>
-          </p:cNvSpPr>
-          <p:nvPr>
-            <p:ph type="title"/>
-          </p:nvPr>
-        </p:nvSpPr>
-        <p:spPr/>
-        <p:txBody>
-          <a:bodyPr/>
-          <a:lstStyle/>
-          <a:p>
-            <a:r>
-              <a:rPr lang="es-ES" dirty="0"/>
-              <a:t>Elementos de arquitectura limpia en Java</a:t>
-            </a:r>
-          </a:p>
-        </p:txBody>
-      </p:sp>
-      <p:sp>
-        <p:nvSpPr>
-          <p:cNvPr id="3" name="Marcador de contenido 2">
-            <a:extLst>
-              <a:ext uri="{FF2B5EF4-FFF2-40B4-BE49-F238E27FC236}">
-                <a16:creationId xmlns:a16="http://schemas.microsoft.com/office/drawing/2014/main" id="{4776B420-0677-6207-33BF-A71D6A794D4E}"/>
-              </a:ext>
-            </a:extLst>
-          </p:cNvPr>
-          <p:cNvSpPr>
-            <a:spLocks noGrp="1"/>
-          </p:cNvSpPr>
-          <p:nvPr>
-            <p:ph idx="1"/>
-          </p:nvPr>
-        </p:nvSpPr>
-        <p:spPr/>
-        <p:txBody>
-          <a:bodyPr>
-            <a:normAutofit fontScale="92500" lnSpcReduction="20000"/>
-          </a:bodyPr>
-          <a:lstStyle/>
-          <a:p>
-            <a:r>
-              <a:rPr lang="es-ES" dirty="0" err="1"/>
-              <a:t>Mapper</a:t>
-            </a:r>
-            <a:endParaRPr lang="es-ES" dirty="0"/>
-          </a:p>
-          <a:p>
-            <a:r>
-              <a:rPr lang="es-ES" dirty="0" err="1"/>
-              <a:t>Handler</a:t>
-            </a:r>
-            <a:endParaRPr lang="es-ES" dirty="0"/>
-          </a:p>
-          <a:p>
-            <a:r>
-              <a:rPr lang="es-ES" dirty="0"/>
-              <a:t>Resolver</a:t>
-            </a:r>
-          </a:p>
-          <a:p>
-            <a:r>
-              <a:rPr lang="es-ES" dirty="0" err="1"/>
-              <a:t>Circuit</a:t>
-            </a:r>
-            <a:r>
-              <a:rPr lang="es-ES" dirty="0"/>
-              <a:t> </a:t>
-            </a:r>
-            <a:r>
-              <a:rPr lang="es-ES" dirty="0" err="1"/>
-              <a:t>Breakers</a:t>
-            </a:r>
-            <a:endParaRPr lang="es-ES" dirty="0"/>
-          </a:p>
-          <a:p>
-            <a:r>
-              <a:rPr lang="es-ES" dirty="0" err="1"/>
-              <a:t>Adapters</a:t>
-            </a:r>
-            <a:endParaRPr lang="es-ES" dirty="0"/>
-          </a:p>
-          <a:p>
-            <a:r>
-              <a:rPr lang="es-ES" dirty="0"/>
-              <a:t>Response</a:t>
-            </a:r>
-          </a:p>
-          <a:p>
-            <a:r>
-              <a:rPr lang="es-ES" dirty="0" err="1"/>
-              <a:t>ValueObjects</a:t>
-            </a:r>
-            <a:endParaRPr lang="es-ES" dirty="0"/>
-          </a:p>
-          <a:p>
-            <a:r>
-              <a:rPr lang="es-ES" dirty="0" err="1"/>
-              <a:t>NamedConstructors</a:t>
-            </a:r>
-            <a:endParaRPr lang="es-ES" dirty="0"/>
-          </a:p>
-          <a:p>
-            <a:r>
-              <a:rPr lang="es-ES" dirty="0"/>
-              <a:t>Publisher</a:t>
-            </a:r>
-          </a:p>
-          <a:p>
-            <a:r>
-              <a:rPr lang="es-ES" dirty="0" err="1"/>
-              <a:t>Mocking</a:t>
-            </a:r>
-            <a:endParaRPr lang="es-ES" dirty="0"/>
-          </a:p>
-        </p:txBody>
-      </p:sp>
-      <p:sp>
-        <p:nvSpPr>
-          <p:cNvPr id="9" name="Marcador de número de diapositiva 3">
-            <a:extLst>
-              <a:ext uri="{FF2B5EF4-FFF2-40B4-BE49-F238E27FC236}">
-                <a16:creationId xmlns:a16="http://schemas.microsoft.com/office/drawing/2014/main" id="{93D8FCB3-2E24-EA19-8D00-4692D6E3D511}"/>
-              </a:ext>
-            </a:extLst>
-          </p:cNvPr>
-          <p:cNvSpPr>
-            <a:spLocks noGrp="1"/>
-          </p:cNvSpPr>
-          <p:nvPr>
-            <p:ph type="sldNum" sz="quarter" idx="4"/>
-          </p:nvPr>
-        </p:nvSpPr>
-        <p:spPr>
-          <a:xfrm>
-            <a:off x="8610600" y="6356350"/>
-            <a:ext cx="2743200" cy="365125"/>
-          </a:xfrm>
-        </p:spPr>
-        <p:txBody>
-          <a:bodyPr/>
-          <a:lstStyle/>
-          <a:p>
-            <a:r>
-              <a:rPr lang="es-ES" dirty="0"/>
-              <a:t>09/2024 | Pepe Fabra Valverde | </a:t>
-            </a:r>
-            <a:fld id="{B87D0AB6-8E4A-4BD5-8779-ABED7EE2B505}" type="slidenum">
-              <a:rPr lang="es-ES" smtClean="0"/>
-              <a:pPr/>
-              <a:t>78</a:t>
-            </a:fld>
-            <a:endParaRPr lang="es-ES" dirty="0"/>
-          </a:p>
-        </p:txBody>
-      </p:sp>
-    </p:spTree>
-    <p:extLst>
-      <p:ext uri="{BB962C8B-B14F-4D97-AF65-F5344CB8AC3E}">
-        <p14:creationId xmlns:p14="http://schemas.microsoft.com/office/powerpoint/2010/main" val="450777699"/>
-      </p:ext>
-    </p:extLst>
-  </p:cSld>
-  <p:clrMapOvr>
-    <a:masterClrMapping/>
-  </p:clrMapOvr>
-</p:sld>
-</file>
-
 <file path=ppt/slides/slide79.xml><?xml version="1.0" encoding="utf-8"?>
 <p:sld xmlns:a="http://schemas.openxmlformats.org/drawingml/2006/main" xmlns:r="http://schemas.openxmlformats.org/officeDocument/2006/relationships" xmlns:p="http://schemas.openxmlformats.org/presentationml/2006/main">
   <p:cSld>
@@ -18334,10 +18576,10 @@
       </p:grpSpPr>
       <p:sp>
         <p:nvSpPr>
-          <p:cNvPr id="4" name="Título 3">
-            <a:extLst>
-              <a:ext uri="{FF2B5EF4-FFF2-40B4-BE49-F238E27FC236}">
-                <a16:creationId xmlns:a16="http://schemas.microsoft.com/office/drawing/2014/main" id="{17A2D0A4-F4FF-156C-EB12-378314C62A8A}"/>
+          <p:cNvPr id="2" name="Título 1">
+            <a:extLst>
+              <a:ext uri="{FF2B5EF4-FFF2-40B4-BE49-F238E27FC236}">
+                <a16:creationId xmlns:a16="http://schemas.microsoft.com/office/drawing/2014/main" id="{AF676BC6-8806-EF5B-B32D-B40D05730EB3}"/>
               </a:ext>
             </a:extLst>
           </p:cNvPr>
@@ -18354,18 +18596,231 @@
           <a:lstStyle/>
           <a:p>
             <a:r>
-              <a:rPr lang="es-ES" dirty="0"/>
-              <a:t>¡¡Gracias por tu tiempo!!</a:t>
-            </a:r>
-          </a:p>
-        </p:txBody>
-      </p:sp>
-      <p:sp>
-        <p:nvSpPr>
-          <p:cNvPr id="8" name="Marcador de número de diapositiva 3">
-            <a:extLst>
-              <a:ext uri="{FF2B5EF4-FFF2-40B4-BE49-F238E27FC236}">
-                <a16:creationId xmlns:a16="http://schemas.microsoft.com/office/drawing/2014/main" id="{6E1A5507-2AE9-8F1B-29A9-D11E80F7856E}"/>
+              <a:rPr lang="es-ES"/>
+              <a:t>Elementos de arquitectura limpia en Java</a:t>
+            </a:r>
+            <a:endParaRPr lang="es-ES" dirty="0"/>
+          </a:p>
+        </p:txBody>
+      </p:sp>
+      <p:sp>
+        <p:nvSpPr>
+          <p:cNvPr id="3" name="Marcador de contenido 2">
+            <a:extLst>
+              <a:ext uri="{FF2B5EF4-FFF2-40B4-BE49-F238E27FC236}">
+                <a16:creationId xmlns:a16="http://schemas.microsoft.com/office/drawing/2014/main" id="{4776B420-0677-6207-33BF-A71D6A794D4E}"/>
+              </a:ext>
+            </a:extLst>
+          </p:cNvPr>
+          <p:cNvSpPr>
+            <a:spLocks noGrp="1"/>
+          </p:cNvSpPr>
+          <p:nvPr>
+            <p:ph idx="1"/>
+          </p:nvPr>
+        </p:nvSpPr>
+        <p:spPr/>
+        <p:txBody>
+          <a:bodyPr>
+            <a:normAutofit/>
+          </a:bodyPr>
+          <a:lstStyle/>
+          <a:p>
+            <a:pPr marL="0" indent="0">
+              <a:buNone/>
+            </a:pPr>
+            <a:r>
+              <a:rPr lang="es-ES" dirty="0" err="1"/>
+              <a:t>Mapper</a:t>
+            </a:r>
+            <a:r>
+              <a:rPr lang="es-ES" dirty="0"/>
+              <a:t>, </a:t>
+            </a:r>
+            <a:r>
+              <a:rPr lang="es-ES" dirty="0" err="1"/>
+              <a:t>Handler</a:t>
+            </a:r>
+            <a:r>
+              <a:rPr lang="es-ES" dirty="0"/>
+              <a:t>, Resolver, </a:t>
+            </a:r>
+            <a:r>
+              <a:rPr lang="es-ES" dirty="0" err="1"/>
+              <a:t>Circuit</a:t>
+            </a:r>
+            <a:r>
+              <a:rPr lang="es-ES" dirty="0"/>
+              <a:t> </a:t>
+            </a:r>
+            <a:r>
+              <a:rPr lang="es-ES" dirty="0" err="1"/>
+              <a:t>Breakers</a:t>
+            </a:r>
+            <a:r>
+              <a:rPr lang="es-ES" dirty="0"/>
+              <a:t>, </a:t>
+            </a:r>
+            <a:r>
+              <a:rPr lang="es-ES" dirty="0" err="1"/>
+              <a:t>Adapters</a:t>
+            </a:r>
+            <a:r>
+              <a:rPr lang="es-ES" dirty="0"/>
+              <a:t>, Response, </a:t>
+            </a:r>
+            <a:r>
+              <a:rPr lang="es-ES" dirty="0" err="1"/>
+              <a:t>ValueObjects</a:t>
+            </a:r>
+            <a:r>
+              <a:rPr lang="es-ES" dirty="0"/>
+              <a:t>, </a:t>
+            </a:r>
+            <a:r>
+              <a:rPr lang="es-ES" dirty="0" err="1"/>
+              <a:t>NamedConstructors</a:t>
+            </a:r>
+            <a:r>
+              <a:rPr lang="es-ES" dirty="0"/>
+              <a:t>, Publisher, </a:t>
+            </a:r>
+            <a:r>
+              <a:rPr lang="es-ES" dirty="0" err="1"/>
+              <a:t>Mocking</a:t>
+            </a:r>
+            <a:r>
+              <a:rPr lang="es-ES" dirty="0"/>
+              <a:t> y muchos más</a:t>
+            </a:r>
+          </a:p>
+          <a:p>
+            <a:pPr marL="0" indent="0">
+              <a:buNone/>
+            </a:pPr>
+            <a:endParaRPr lang="es-ES" dirty="0"/>
+          </a:p>
+          <a:p>
+            <a:pPr marL="0" indent="0">
+              <a:buNone/>
+            </a:pPr>
+            <a:r>
+              <a:rPr lang="es-ES" dirty="0"/>
+              <a:t>Lecturas al respecto:</a:t>
+            </a:r>
+          </a:p>
+          <a:p>
+            <a:r>
+              <a:rPr lang="es-ES" dirty="0" err="1"/>
+              <a:t>Implementing</a:t>
+            </a:r>
+            <a:r>
+              <a:rPr lang="es-ES" dirty="0"/>
+              <a:t> </a:t>
+            </a:r>
+            <a:r>
+              <a:rPr lang="es-ES" dirty="0" err="1"/>
+              <a:t>Domain-Driven</a:t>
+            </a:r>
+            <a:r>
+              <a:rPr lang="es-ES" dirty="0"/>
+              <a:t> </a:t>
+            </a:r>
+            <a:r>
+              <a:rPr lang="es-ES" dirty="0" err="1"/>
+              <a:t>Design</a:t>
+            </a:r>
+            <a:endParaRPr lang="es-ES" dirty="0"/>
+          </a:p>
+          <a:p>
+            <a:r>
+              <a:rPr lang="es-ES" dirty="0" err="1"/>
+              <a:t>Design</a:t>
+            </a:r>
+            <a:r>
+              <a:rPr lang="es-ES" dirty="0"/>
+              <a:t> </a:t>
+            </a:r>
+            <a:r>
+              <a:rPr lang="es-ES" dirty="0" err="1"/>
+              <a:t>Patterns</a:t>
+            </a:r>
+            <a:r>
+              <a:rPr lang="es-ES" dirty="0"/>
+              <a:t> </a:t>
+            </a:r>
+            <a:r>
+              <a:rPr lang="es-ES" dirty="0" err="1"/>
+              <a:t>of</a:t>
+            </a:r>
+            <a:r>
+              <a:rPr lang="es-ES" dirty="0"/>
+              <a:t> Reusable </a:t>
+            </a:r>
+            <a:r>
+              <a:rPr lang="es-ES" dirty="0" err="1"/>
+              <a:t>Elements</a:t>
+            </a:r>
+            <a:r>
+              <a:rPr lang="es-ES" dirty="0"/>
+              <a:t> </a:t>
+            </a:r>
+            <a:r>
+              <a:rPr lang="es-ES" dirty="0" err="1"/>
+              <a:t>of</a:t>
+            </a:r>
+            <a:r>
+              <a:rPr lang="es-ES" dirty="0"/>
+              <a:t> </a:t>
+            </a:r>
+            <a:r>
+              <a:rPr lang="es-ES" dirty="0" err="1"/>
+              <a:t>Object-Oriented</a:t>
+            </a:r>
+            <a:r>
+              <a:rPr lang="es-ES" dirty="0"/>
+              <a:t> Software</a:t>
+            </a:r>
+          </a:p>
+          <a:p>
+            <a:r>
+              <a:rPr lang="es-ES" dirty="0" err="1"/>
+              <a:t>Patterns</a:t>
+            </a:r>
+            <a:r>
+              <a:rPr lang="es-ES" dirty="0"/>
+              <a:t> </a:t>
+            </a:r>
+            <a:r>
+              <a:rPr lang="es-ES" dirty="0" err="1"/>
+              <a:t>of</a:t>
+            </a:r>
+            <a:r>
+              <a:rPr lang="es-ES" dirty="0"/>
+              <a:t> Enterprise </a:t>
+            </a:r>
+            <a:r>
+              <a:rPr lang="es-ES" dirty="0" err="1"/>
+              <a:t>Application</a:t>
+            </a:r>
+            <a:r>
+              <a:rPr lang="es-ES" dirty="0"/>
+              <a:t> </a:t>
+            </a:r>
+            <a:r>
+              <a:rPr lang="es-ES" dirty="0" err="1"/>
+              <a:t>Architecture</a:t>
+            </a:r>
+            <a:endParaRPr lang="es-ES" dirty="0"/>
+          </a:p>
+        </p:txBody>
+      </p:sp>
+      <p:sp>
+        <p:nvSpPr>
+          <p:cNvPr id="9" name="Marcador de número de diapositiva 3">
+            <a:extLst>
+              <a:ext uri="{FF2B5EF4-FFF2-40B4-BE49-F238E27FC236}">
+                <a16:creationId xmlns:a16="http://schemas.microsoft.com/office/drawing/2014/main" id="{93D8FCB3-2E24-EA19-8D00-4692D6E3D511}"/>
               </a:ext>
             </a:extLst>
           </p:cNvPr>
@@ -18387,13 +18842,110 @@
           <a:lstStyle/>
           <a:p>
             <a:r>
-              <a:rPr lang="es-ES" dirty="0"/>
+              <a:rPr lang="es-ES"/>
               <a:t>09/2024 | Pepe Fabra Valverde | </a:t>
             </a:r>
             <a:fld id="{B87D0AB6-8E4A-4BD5-8779-ABED7EE2B505}" type="slidenum">
               <a:rPr lang="es-ES" smtClean="0"/>
               <a:pPr/>
               <a:t>80</a:t>
+            </a:fld>
+            <a:endParaRPr lang="es-ES" dirty="0"/>
+          </a:p>
+        </p:txBody>
+      </p:sp>
+    </p:spTree>
+    <p:extLst>
+      <p:ext uri="{BB962C8B-B14F-4D97-AF65-F5344CB8AC3E}">
+        <p14:creationId xmlns:p14="http://schemas.microsoft.com/office/powerpoint/2010/main" val="450777699"/>
+      </p:ext>
+    </p:extLst>
+  </p:cSld>
+  <p:clrMapOvr>
+    <a:masterClrMapping/>
+  </p:clrMapOvr>
+</p:sld>
+</file>
+
+<file path=ppt/slides/slide81.xml><?xml version="1.0" encoding="utf-8"?>
+<p:sld xmlns:a="http://schemas.openxmlformats.org/drawingml/2006/main" xmlns:r="http://schemas.openxmlformats.org/officeDocument/2006/relationships" xmlns:p="http://schemas.openxmlformats.org/presentationml/2006/main">
+  <p:cSld>
+    <p:spTree>
+      <p:nvGrpSpPr>
+        <p:cNvPr id="1" name=""/>
+        <p:cNvGrpSpPr/>
+        <p:nvPr/>
+      </p:nvGrpSpPr>
+      <p:grpSpPr>
+        <a:xfrm>
+          <a:off x="0" y="0"/>
+          <a:ext cx="0" cy="0"/>
+          <a:chOff x="0" y="0"/>
+          <a:chExt cx="0" cy="0"/>
+        </a:xfrm>
+      </p:grpSpPr>
+      <p:sp>
+        <p:nvSpPr>
+          <p:cNvPr id="4" name="Título 3">
+            <a:extLst>
+              <a:ext uri="{FF2B5EF4-FFF2-40B4-BE49-F238E27FC236}">
+                <a16:creationId xmlns:a16="http://schemas.microsoft.com/office/drawing/2014/main" id="{17A2D0A4-F4FF-156C-EB12-378314C62A8A}"/>
+              </a:ext>
+            </a:extLst>
+          </p:cNvPr>
+          <p:cNvSpPr>
+            <a:spLocks noGrp="1"/>
+          </p:cNvSpPr>
+          <p:nvPr>
+            <p:ph type="title"/>
+          </p:nvPr>
+        </p:nvSpPr>
+        <p:spPr/>
+        <p:txBody>
+          <a:bodyPr/>
+          <a:lstStyle/>
+          <a:p>
+            <a:r>
+              <a:rPr lang="es-ES" dirty="0"/>
+              <a:t>¡¡Gracias por tu tiempo!!</a:t>
+            </a:r>
+          </a:p>
+        </p:txBody>
+      </p:sp>
+      <p:sp>
+        <p:nvSpPr>
+          <p:cNvPr id="8" name="Marcador de número de diapositiva 3">
+            <a:extLst>
+              <a:ext uri="{FF2B5EF4-FFF2-40B4-BE49-F238E27FC236}">
+                <a16:creationId xmlns:a16="http://schemas.microsoft.com/office/drawing/2014/main" id="{6E1A5507-2AE9-8F1B-29A9-D11E80F7856E}"/>
+              </a:ext>
+            </a:extLst>
+          </p:cNvPr>
+          <p:cNvSpPr>
+            <a:spLocks noGrp="1"/>
+          </p:cNvSpPr>
+          <p:nvPr>
+            <p:ph type="sldNum" sz="quarter" idx="4"/>
+          </p:nvPr>
+        </p:nvSpPr>
+        <p:spPr>
+          <a:xfrm>
+            <a:off x="8610600" y="6356350"/>
+            <a:ext cx="2743200" cy="365125"/>
+          </a:xfrm>
+        </p:spPr>
+        <p:txBody>
+          <a:bodyPr/>
+          <a:lstStyle/>
+          <a:p>
+            <a:r>
+              <a:rPr lang="es-ES" dirty="0"/>
+              <a:t>09/2024 | Pepe Fabra Valverde | </a:t>
+            </a:r>
+            <a:fld id="{B87D0AB6-8E4A-4BD5-8779-ABED7EE2B505}" type="slidenum">
+              <a:rPr lang="es-ES" smtClean="0"/>
+              <a:pPr/>
+              <a:t>81</a:t>
             </a:fld>
             <a:endParaRPr lang="es-ES" dirty="0"/>
           </a:p>

</xml_diff>